<commit_message>
Made edits to CLI Git powerpoint, including adding a couple slides that: 1. outlined what we'd be covering in the CLI unit and 2. gave an example from my sentiment analysis project of how I would use the CLI in day-to-day project use.
</commit_message>
<xml_diff>
--- a/2019/misc/CLI Git.pptx
+++ b/2019/misc/CLI Git.pptx
@@ -6,26 +6,28 @@
   </p:sldMasterIdLst>
   <p:sldIdLst>
     <p:sldId id="256" r:id="rId2"/>
-    <p:sldId id="257" r:id="rId3"/>
-    <p:sldId id="284" r:id="rId4"/>
-    <p:sldId id="258" r:id="rId5"/>
-    <p:sldId id="259" r:id="rId6"/>
-    <p:sldId id="261" r:id="rId7"/>
-    <p:sldId id="263" r:id="rId8"/>
-    <p:sldId id="268" r:id="rId9"/>
-    <p:sldId id="282" r:id="rId10"/>
-    <p:sldId id="264" r:id="rId11"/>
-    <p:sldId id="269" r:id="rId12"/>
-    <p:sldId id="271" r:id="rId13"/>
-    <p:sldId id="273" r:id="rId14"/>
-    <p:sldId id="274" r:id="rId15"/>
-    <p:sldId id="272" r:id="rId16"/>
-    <p:sldId id="275" r:id="rId17"/>
-    <p:sldId id="277" r:id="rId18"/>
-    <p:sldId id="283" r:id="rId19"/>
-    <p:sldId id="278" r:id="rId20"/>
-    <p:sldId id="279" r:id="rId21"/>
-    <p:sldId id="281" r:id="rId22"/>
+    <p:sldId id="285" r:id="rId3"/>
+    <p:sldId id="257" r:id="rId4"/>
+    <p:sldId id="284" r:id="rId5"/>
+    <p:sldId id="258" r:id="rId6"/>
+    <p:sldId id="259" r:id="rId7"/>
+    <p:sldId id="261" r:id="rId8"/>
+    <p:sldId id="263" r:id="rId9"/>
+    <p:sldId id="268" r:id="rId10"/>
+    <p:sldId id="282" r:id="rId11"/>
+    <p:sldId id="286" r:id="rId12"/>
+    <p:sldId id="264" r:id="rId13"/>
+    <p:sldId id="269" r:id="rId14"/>
+    <p:sldId id="271" r:id="rId15"/>
+    <p:sldId id="273" r:id="rId16"/>
+    <p:sldId id="274" r:id="rId17"/>
+    <p:sldId id="272" r:id="rId18"/>
+    <p:sldId id="275" r:id="rId19"/>
+    <p:sldId id="277" r:id="rId20"/>
+    <p:sldId id="283" r:id="rId21"/>
+    <p:sldId id="278" r:id="rId22"/>
+    <p:sldId id="279" r:id="rId23"/>
+    <p:sldId id="281" r:id="rId24"/>
   </p:sldIdLst>
   <p:sldSz cx="12192000" cy="6858000"/>
   <p:notesSz cx="6858000" cy="9144000"/>
@@ -289,7 +291,7 @@
           <a:p>
             <a:fld id="{F4EAFB54-7980-41A8-B151-9D25B292734F}" type="datetimeFigureOut">
               <a:rPr lang="en-US" smtClean="0"/>
-              <a:t>6/3/2018</a:t>
+              <a:t>5/22/2019</a:t>
             </a:fld>
             <a:endParaRPr lang="en-US"/>
           </a:p>
@@ -459,7 +461,7 @@
           <a:p>
             <a:fld id="{F4EAFB54-7980-41A8-B151-9D25B292734F}" type="datetimeFigureOut">
               <a:rPr lang="en-US" smtClean="0"/>
-              <a:t>6/3/2018</a:t>
+              <a:t>5/22/2019</a:t>
             </a:fld>
             <a:endParaRPr lang="en-US"/>
           </a:p>
@@ -639,7 +641,7 @@
           <a:p>
             <a:fld id="{F4EAFB54-7980-41A8-B151-9D25B292734F}" type="datetimeFigureOut">
               <a:rPr lang="en-US" smtClean="0"/>
-              <a:t>6/3/2018</a:t>
+              <a:t>5/22/2019</a:t>
             </a:fld>
             <a:endParaRPr lang="en-US"/>
           </a:p>
@@ -809,7 +811,7 @@
           <a:p>
             <a:fld id="{F4EAFB54-7980-41A8-B151-9D25B292734F}" type="datetimeFigureOut">
               <a:rPr lang="en-US" smtClean="0"/>
-              <a:t>6/3/2018</a:t>
+              <a:t>5/22/2019</a:t>
             </a:fld>
             <a:endParaRPr lang="en-US"/>
           </a:p>
@@ -1055,7 +1057,7 @@
           <a:p>
             <a:fld id="{F4EAFB54-7980-41A8-B151-9D25B292734F}" type="datetimeFigureOut">
               <a:rPr lang="en-US" smtClean="0"/>
-              <a:t>6/3/2018</a:t>
+              <a:t>5/22/2019</a:t>
             </a:fld>
             <a:endParaRPr lang="en-US"/>
           </a:p>
@@ -1287,7 +1289,7 @@
           <a:p>
             <a:fld id="{F4EAFB54-7980-41A8-B151-9D25B292734F}" type="datetimeFigureOut">
               <a:rPr lang="en-US" smtClean="0"/>
-              <a:t>6/3/2018</a:t>
+              <a:t>5/22/2019</a:t>
             </a:fld>
             <a:endParaRPr lang="en-US"/>
           </a:p>
@@ -1654,7 +1656,7 @@
           <a:p>
             <a:fld id="{F4EAFB54-7980-41A8-B151-9D25B292734F}" type="datetimeFigureOut">
               <a:rPr lang="en-US" smtClean="0"/>
-              <a:t>6/3/2018</a:t>
+              <a:t>5/22/2019</a:t>
             </a:fld>
             <a:endParaRPr lang="en-US"/>
           </a:p>
@@ -1772,7 +1774,7 @@
           <a:p>
             <a:fld id="{F4EAFB54-7980-41A8-B151-9D25B292734F}" type="datetimeFigureOut">
               <a:rPr lang="en-US" smtClean="0"/>
-              <a:t>6/3/2018</a:t>
+              <a:t>5/22/2019</a:t>
             </a:fld>
             <a:endParaRPr lang="en-US"/>
           </a:p>
@@ -1867,7 +1869,7 @@
           <a:p>
             <a:fld id="{F4EAFB54-7980-41A8-B151-9D25B292734F}" type="datetimeFigureOut">
               <a:rPr lang="en-US" smtClean="0"/>
-              <a:t>6/3/2018</a:t>
+              <a:t>5/22/2019</a:t>
             </a:fld>
             <a:endParaRPr lang="en-US"/>
           </a:p>
@@ -2144,7 +2146,7 @@
           <a:p>
             <a:fld id="{F4EAFB54-7980-41A8-B151-9D25B292734F}" type="datetimeFigureOut">
               <a:rPr lang="en-US" smtClean="0"/>
-              <a:t>6/3/2018</a:t>
+              <a:t>5/22/2019</a:t>
             </a:fld>
             <a:endParaRPr lang="en-US"/>
           </a:p>
@@ -2397,7 +2399,7 @@
           <a:p>
             <a:fld id="{F4EAFB54-7980-41A8-B151-9D25B292734F}" type="datetimeFigureOut">
               <a:rPr lang="en-US" smtClean="0"/>
-              <a:t>6/3/2018</a:t>
+              <a:t>5/22/2019</a:t>
             </a:fld>
             <a:endParaRPr lang="en-US"/>
           </a:p>
@@ -2610,7 +2612,7 @@
           <a:p>
             <a:fld id="{F4EAFB54-7980-41A8-B151-9D25B292734F}" type="datetimeFigureOut">
               <a:rPr lang="en-US" smtClean="0"/>
-              <a:t>6/3/2018</a:t>
+              <a:t>5/22/2019</a:t>
             </a:fld>
             <a:endParaRPr lang="en-US"/>
           </a:p>
@@ -3055,8 +3057,13 @@
           <a:p>
             <a:r>
               <a:rPr lang="en-US" dirty="0" smtClean="0"/>
-              <a:t>HILT 2018</a:t>
-            </a:r>
+              <a:t>HILT </a:t>
+            </a:r>
+            <a:r>
+              <a:rPr lang="en-US" dirty="0" smtClean="0"/>
+              <a:t>2019</a:t>
+            </a:r>
+            <a:endParaRPr lang="en-US" dirty="0" smtClean="0"/>
           </a:p>
           <a:p>
             <a:endParaRPr lang="en-US" dirty="0"/>
@@ -3102,109 +3109,15 @@
       </p:grpSpPr>
       <p:sp>
         <p:nvSpPr>
-          <p:cNvPr id="5" name="Rectangle 4"/>
-          <p:cNvSpPr/>
+          <p:cNvPr id="6" name="Title 1"/>
+          <p:cNvSpPr txBox="1">
+            <a:spLocks/>
+          </p:cNvSpPr>
           <p:nvPr/>
         </p:nvSpPr>
         <p:spPr>
           <a:xfrm>
-            <a:off x="777210" y="1636296"/>
-            <a:ext cx="10564559" cy="4524315"/>
-          </a:xfrm>
-          <a:prstGeom prst="rect">
-            <a:avLst/>
-          </a:prstGeom>
-        </p:spPr>
-        <p:style>
-          <a:lnRef idx="1">
-            <a:schemeClr val="accent6"/>
-          </a:lnRef>
-          <a:fillRef idx="2">
-            <a:schemeClr val="accent6"/>
-          </a:fillRef>
-          <a:effectRef idx="1">
-            <a:schemeClr val="accent6"/>
-          </a:effectRef>
-          <a:fontRef idx="minor">
-            <a:schemeClr val="dk1"/>
-          </a:fontRef>
-        </p:style>
-        <p:txBody>
-          <a:bodyPr wrap="none">
-            <a:spAutoFit/>
-          </a:bodyPr>
-          <a:lstStyle/>
-          <a:p>
-            <a:r>
-              <a:rPr lang="en-US" sz="3200" dirty="0" smtClean="0"/>
-              <a:t>Learn Code the Hard way</a:t>
-            </a:r>
-            <a:endParaRPr lang="en-US" sz="3200" dirty="0" smtClean="0">
-              <a:hlinkClick r:id="rId2"/>
-            </a:endParaRPr>
-          </a:p>
-          <a:p>
-            <a:r>
-              <a:rPr lang="en-US" sz="3200" dirty="0" smtClean="0">
-                <a:hlinkClick r:id="rId2"/>
-              </a:rPr>
-              <a:t>http://cli.learncodethehardway.org/</a:t>
-            </a:r>
-            <a:endParaRPr lang="en-US" sz="3200" dirty="0" smtClean="0"/>
-          </a:p>
-          <a:p>
-            <a:endParaRPr lang="en-US" sz="3200" dirty="0" smtClean="0"/>
-          </a:p>
-          <a:p>
-            <a:r>
-              <a:rPr lang="en-US" sz="3200" dirty="0" err="1" smtClean="0"/>
-              <a:t>Codecademy</a:t>
-            </a:r>
-            <a:endParaRPr lang="en-US" sz="3200" dirty="0"/>
-          </a:p>
-          <a:p>
-            <a:r>
-              <a:rPr lang="en-US" sz="3200" dirty="0" smtClean="0">
-                <a:hlinkClick r:id="rId3"/>
-              </a:rPr>
-              <a:t>https://www.codecademy.com/learn/learn-the-command-line</a:t>
-            </a:r>
-            <a:endParaRPr lang="en-US" sz="3200" dirty="0" smtClean="0"/>
-          </a:p>
-          <a:p>
-            <a:endParaRPr lang="en-US" sz="3200" dirty="0"/>
-          </a:p>
-          <a:p>
-            <a:r>
-              <a:rPr lang="en-US" sz="3200" dirty="0" smtClean="0"/>
-              <a:t>CLI Quiz</a:t>
-            </a:r>
-          </a:p>
-          <a:p>
-            <a:r>
-              <a:rPr lang="en-US" sz="3200" dirty="0" smtClean="0">
-                <a:hlinkClick r:id="rId4"/>
-              </a:rPr>
-              <a:t>https://github.com/bmw9t/command_line_quiz/</a:t>
-            </a:r>
-            <a:endParaRPr lang="en-US" sz="3200" dirty="0" smtClean="0"/>
-          </a:p>
-          <a:p>
-            <a:endParaRPr lang="en-US" sz="3200" dirty="0" smtClean="0"/>
-          </a:p>
-        </p:txBody>
-      </p:sp>
-      <p:sp>
-        <p:nvSpPr>
-          <p:cNvPr id="7" name="Title 1"/>
-          <p:cNvSpPr txBox="1">
-            <a:spLocks/>
-          </p:cNvSpPr>
-          <p:nvPr/>
-        </p:nvSpPr>
-        <p:spPr>
-          <a:xfrm>
-            <a:off x="2197769" y="-385595"/>
+            <a:off x="3176337" y="-481847"/>
             <a:ext cx="9144000" cy="2387600"/>
           </a:xfrm>
           <a:prstGeom prst="rect">
@@ -3237,16 +3150,46 @@
           <a:p>
             <a:r>
               <a:rPr lang="en-US" dirty="0" smtClean="0"/>
-              <a:t>Getting Help for the NEXT LEVEL</a:t>
+              <a:t>With great power….</a:t>
             </a:r>
             <a:endParaRPr lang="en-US" dirty="0"/>
           </a:p>
         </p:txBody>
       </p:sp>
+      <p:pic>
+        <p:nvPicPr>
+          <p:cNvPr id="3" name="Picture 2"/>
+          <p:cNvPicPr>
+            <a:picLocks noChangeAspect="1"/>
+          </p:cNvPicPr>
+          <p:nvPr/>
+        </p:nvPicPr>
+        <p:blipFill>
+          <a:blip r:embed="rId2">
+            <a:extLst>
+              <a:ext uri="{28A0092B-C50C-407E-A947-70E740481C1C}">
+                <a14:useLocalDpi xmlns:a14="http://schemas.microsoft.com/office/drawing/2010/main" val="0"/>
+              </a:ext>
+            </a:extLst>
+          </a:blip>
+          <a:stretch>
+            <a:fillRect/>
+          </a:stretch>
+        </p:blipFill>
+        <p:spPr>
+          <a:xfrm>
+            <a:off x="1138988" y="1299411"/>
+            <a:ext cx="9596437" cy="4952999"/>
+          </a:xfrm>
+          <a:prstGeom prst="rect">
+            <a:avLst/>
+          </a:prstGeom>
+        </p:spPr>
+      </p:pic>
     </p:spTree>
     <p:extLst>
       <p:ext uri="{BB962C8B-B14F-4D97-AF65-F5344CB8AC3E}">
-        <p14:creationId xmlns:p14="http://schemas.microsoft.com/office/powerpoint/2010/main" val="923527942"/>
+        <p14:creationId xmlns:p14="http://schemas.microsoft.com/office/powerpoint/2010/main" val="1779352926"/>
       </p:ext>
     </p:extLst>
   </p:cSld>
@@ -3280,54 +3223,61 @@
           <a:chExt cx="0" cy="0"/>
         </a:xfrm>
       </p:grpSpPr>
-      <p:sp>
-        <p:nvSpPr>
-          <p:cNvPr id="2" name="Title 1"/>
-          <p:cNvSpPr>
-            <a:spLocks noGrp="1"/>
-          </p:cNvSpPr>
-          <p:nvPr>
-            <p:ph type="ctrTitle"/>
-          </p:nvPr>
-        </p:nvSpPr>
-        <p:spPr/>
-        <p:txBody>
-          <a:bodyPr/>
+      <p:pic>
+        <p:nvPicPr>
+          <p:cNvPr id="4" name="Picture 3"/>
+          <p:cNvPicPr>
+            <a:picLocks noChangeAspect="1"/>
+          </p:cNvPicPr>
+          <p:nvPr/>
+        </p:nvPicPr>
+        <p:blipFill rotWithShape="1">
+          <a:blip r:embed="rId2">
+            <a:extLst>
+              <a:ext uri="{28A0092B-C50C-407E-A947-70E740481C1C}">
+                <a14:useLocalDpi xmlns:a14="http://schemas.microsoft.com/office/drawing/2010/main" val="0"/>
+              </a:ext>
+            </a:extLst>
+          </a:blip>
+          <a:srcRect t="-1" b="12944"/>
+          <a:stretch/>
+        </p:blipFill>
+        <p:spPr>
+          <a:xfrm>
+            <a:off x="2063431" y="1224950"/>
+            <a:ext cx="7724676" cy="5463901"/>
+          </a:xfrm>
+          <a:prstGeom prst="rect">
+            <a:avLst/>
+          </a:prstGeom>
+        </p:spPr>
+      </p:pic>
+      <p:sp>
+        <p:nvSpPr>
+          <p:cNvPr id="5" name="Title 1"/>
+          <p:cNvSpPr>
+            <a:spLocks noGrp="1"/>
+          </p:cNvSpPr>
+          <p:nvPr>
+            <p:ph type="title"/>
+          </p:nvPr>
+        </p:nvSpPr>
+        <p:spPr>
+          <a:xfrm>
+            <a:off x="855451" y="155519"/>
+            <a:ext cx="10703943" cy="1285093"/>
+          </a:xfrm>
+        </p:spPr>
+        <p:txBody>
+          <a:bodyPr>
+            <a:normAutofit/>
+          </a:bodyPr>
           <a:lstStyle/>
           <a:p>
             <a:r>
               <a:rPr lang="en-US" dirty="0" smtClean="0"/>
-              <a:t>Introduction to </a:t>
-            </a:r>
-            <a:r>
-              <a:rPr lang="en-US" dirty="0" err="1" smtClean="0"/>
-              <a:t>Git</a:t>
-            </a:r>
-            <a:endParaRPr lang="en-US" dirty="0"/>
-          </a:p>
-        </p:txBody>
-      </p:sp>
-      <p:sp>
-        <p:nvSpPr>
-          <p:cNvPr id="3" name="Subtitle 2"/>
-          <p:cNvSpPr>
-            <a:spLocks noGrp="1"/>
-          </p:cNvSpPr>
-          <p:nvPr>
-            <p:ph type="subTitle" idx="1"/>
-          </p:nvPr>
-        </p:nvSpPr>
-        <p:spPr/>
-        <p:txBody>
-          <a:bodyPr/>
-          <a:lstStyle/>
-          <a:p>
-            <a:r>
-              <a:rPr lang="en-US" dirty="0" smtClean="0"/>
-              <a:t>HILT 2018</a:t>
-            </a:r>
-          </a:p>
-          <a:p>
+              <a:t>So why would I use the CLI in a DH project?</a:t>
+            </a:r>
             <a:endParaRPr lang="en-US" dirty="0"/>
           </a:p>
         </p:txBody>
@@ -3335,20 +3285,13 @@
     </p:spTree>
     <p:extLst>
       <p:ext uri="{BB962C8B-B14F-4D97-AF65-F5344CB8AC3E}">
-        <p14:creationId xmlns:p14="http://schemas.microsoft.com/office/powerpoint/2010/main" val="4066827190"/>
+        <p14:creationId xmlns:p14="http://schemas.microsoft.com/office/powerpoint/2010/main" val="1376722408"/>
       </p:ext>
     </p:extLst>
   </p:cSld>
   <p:clrMapOvr>
     <a:masterClrMapping/>
   </p:clrMapOvr>
-  <p:timing>
-    <p:tnLst>
-      <p:par>
-        <p:cTn id="1" dur="indefinite" restart="never" nodeType="tmRoot"/>
-      </p:par>
-    </p:tnLst>
-  </p:timing>
 </p:sld>
 </file>
 
@@ -3371,77 +3314,151 @@
       </p:grpSpPr>
       <p:sp>
         <p:nvSpPr>
-          <p:cNvPr id="2" name="Title 1"/>
-          <p:cNvSpPr>
-            <a:spLocks noGrp="1"/>
-          </p:cNvSpPr>
-          <p:nvPr>
-            <p:ph type="title"/>
-          </p:nvPr>
-        </p:nvSpPr>
-        <p:spPr/>
-        <p:txBody>
-          <a:bodyPr/>
-          <a:lstStyle/>
-          <a:p>
-            <a:pPr algn="ctr"/>
-            <a:r>
-              <a:rPr lang="en-US" dirty="0" smtClean="0"/>
-              <a:t>Version Controlling</a:t>
-            </a:r>
-            <a:endParaRPr lang="en-US" dirty="0"/>
-          </a:p>
-        </p:txBody>
-      </p:sp>
-      <p:sp>
-        <p:nvSpPr>
-          <p:cNvPr id="3" name="Content Placeholder 2"/>
-          <p:cNvSpPr>
-            <a:spLocks noGrp="1"/>
-          </p:cNvSpPr>
-          <p:nvPr>
-            <p:ph idx="1"/>
-          </p:nvPr>
-        </p:nvSpPr>
-        <p:spPr/>
-        <p:txBody>
-          <a:bodyPr>
+          <p:cNvPr id="5" name="Rectangle 4"/>
+          <p:cNvSpPr/>
+          <p:nvPr/>
+        </p:nvSpPr>
+        <p:spPr>
+          <a:xfrm>
+            <a:off x="777210" y="1636296"/>
+            <a:ext cx="10564559" cy="4524315"/>
+          </a:xfrm>
+          <a:prstGeom prst="rect">
+            <a:avLst/>
+          </a:prstGeom>
+        </p:spPr>
+        <p:style>
+          <a:lnRef idx="1">
+            <a:schemeClr val="accent6"/>
+          </a:lnRef>
+          <a:fillRef idx="2">
+            <a:schemeClr val="accent6"/>
+          </a:fillRef>
+          <a:effectRef idx="1">
+            <a:schemeClr val="accent6"/>
+          </a:effectRef>
+          <a:fontRef idx="minor">
+            <a:schemeClr val="dk1"/>
+          </a:fontRef>
+        </p:style>
+        <p:txBody>
+          <a:bodyPr wrap="none">
+            <a:spAutoFit/>
+          </a:bodyPr>
+          <a:lstStyle/>
+          <a:p>
+            <a:r>
+              <a:rPr lang="en-US" sz="3200" dirty="0" smtClean="0"/>
+              <a:t>Learn Code the Hard way</a:t>
+            </a:r>
+            <a:endParaRPr lang="en-US" sz="3200" dirty="0" smtClean="0">
+              <a:hlinkClick r:id="rId2"/>
+            </a:endParaRPr>
+          </a:p>
+          <a:p>
+            <a:r>
+              <a:rPr lang="en-US" sz="3200" dirty="0" smtClean="0">
+                <a:hlinkClick r:id="rId2"/>
+              </a:rPr>
+              <a:t>http://cli.learncodethehardway.org/</a:t>
+            </a:r>
+            <a:endParaRPr lang="en-US" sz="3200" dirty="0" smtClean="0"/>
+          </a:p>
+          <a:p>
+            <a:endParaRPr lang="en-US" sz="3200" dirty="0" smtClean="0"/>
+          </a:p>
+          <a:p>
+            <a:r>
+              <a:rPr lang="en-US" sz="3200" dirty="0" err="1" smtClean="0"/>
+              <a:t>Codecademy</a:t>
+            </a:r>
+            <a:endParaRPr lang="en-US" sz="3200" dirty="0"/>
+          </a:p>
+          <a:p>
+            <a:r>
+              <a:rPr lang="en-US" sz="3200" dirty="0" smtClean="0">
+                <a:hlinkClick r:id="rId3"/>
+              </a:rPr>
+              <a:t>https://www.codecademy.com/learn/learn-the-command-line</a:t>
+            </a:r>
+            <a:endParaRPr lang="en-US" sz="3200" dirty="0" smtClean="0"/>
+          </a:p>
+          <a:p>
+            <a:endParaRPr lang="en-US" sz="3200" dirty="0"/>
+          </a:p>
+          <a:p>
+            <a:r>
+              <a:rPr lang="en-US" sz="3200" dirty="0" smtClean="0"/>
+              <a:t>CLI Quiz</a:t>
+            </a:r>
+          </a:p>
+          <a:p>
+            <a:r>
+              <a:rPr lang="en-US" sz="3200" dirty="0" smtClean="0">
+                <a:hlinkClick r:id="rId4"/>
+              </a:rPr>
+              <a:t>https://github.com/bmw9t/command_line_quiz/</a:t>
+            </a:r>
+            <a:endParaRPr lang="en-US" sz="3200" dirty="0" smtClean="0"/>
+          </a:p>
+          <a:p>
+            <a:endParaRPr lang="en-US" sz="3200" dirty="0" smtClean="0"/>
+          </a:p>
+        </p:txBody>
+      </p:sp>
+      <p:sp>
+        <p:nvSpPr>
+          <p:cNvPr id="7" name="Title 1"/>
+          <p:cNvSpPr txBox="1">
+            <a:spLocks/>
+          </p:cNvSpPr>
+          <p:nvPr/>
+        </p:nvSpPr>
+        <p:spPr>
+          <a:xfrm>
+            <a:off x="2197769" y="-385595"/>
+            <a:ext cx="9144000" cy="2387600"/>
+          </a:xfrm>
+          <a:prstGeom prst="rect">
+            <a:avLst/>
+          </a:prstGeom>
+        </p:spPr>
+        <p:txBody>
+          <a:bodyPr vert="horz" lIns="91440" tIns="45720" rIns="91440" bIns="45720" rtlCol="0" anchor="ctr">
             <a:normAutofit/>
           </a:bodyPr>
-          <a:lstStyle/>
-          <a:p>
-            <a:r>
-              <a:rPr lang="en-US" sz="3600" dirty="0" smtClean="0"/>
-              <a:t>Save TONS of different versions of project over time.</a:t>
-            </a:r>
-          </a:p>
-          <a:p>
-            <a:r>
-              <a:rPr lang="en-US" sz="3600" dirty="0" smtClean="0"/>
-              <a:t>Can recover ANY of those iterations.</a:t>
-            </a:r>
-          </a:p>
-          <a:p>
-            <a:r>
-              <a:rPr lang="en-US" sz="3600" dirty="0" smtClean="0"/>
-              <a:t>Nothing is ever lost.</a:t>
-            </a:r>
-          </a:p>
-          <a:p>
-            <a:r>
-              <a:rPr lang="en-US" sz="3600" dirty="0" smtClean="0"/>
-              <a:t>The date, time, and extent of every change is logged (so is the person who made the changes).</a:t>
-            </a:r>
-          </a:p>
-          <a:p>
-            <a:endParaRPr lang="en-US" sz="3600" dirty="0"/>
+          <a:lstStyle>
+            <a:lvl1pPr algn="l" defTabSz="914400" rtl="0" eaLnBrk="1" latinLnBrk="0" hangingPunct="1">
+              <a:lnSpc>
+                <a:spcPct val="90000"/>
+              </a:lnSpc>
+              <a:spcBef>
+                <a:spcPct val="0"/>
+              </a:spcBef>
+              <a:buNone/>
+              <a:defRPr sz="4400" kern="1200">
+                <a:solidFill>
+                  <a:schemeClr val="tx1"/>
+                </a:solidFill>
+                <a:latin typeface="+mj-lt"/>
+                <a:ea typeface="+mj-ea"/>
+                <a:cs typeface="+mj-cs"/>
+              </a:defRPr>
+            </a:lvl1pPr>
+          </a:lstStyle>
+          <a:p>
+            <a:r>
+              <a:rPr lang="en-US" dirty="0" smtClean="0"/>
+              <a:t>Getting Help for the NEXT LEVEL</a:t>
+            </a:r>
+            <a:endParaRPr lang="en-US" dirty="0"/>
           </a:p>
         </p:txBody>
       </p:sp>
     </p:spTree>
     <p:extLst>
       <p:ext uri="{BB962C8B-B14F-4D97-AF65-F5344CB8AC3E}">
-        <p14:creationId xmlns:p14="http://schemas.microsoft.com/office/powerpoint/2010/main" val="2341958008"/>
+        <p14:creationId xmlns:p14="http://schemas.microsoft.com/office/powerpoint/2010/main" val="923527942"/>
       </p:ext>
     </p:extLst>
   </p:cSld>
@@ -3475,68 +3492,67 @@
           <a:chExt cx="0" cy="0"/>
         </a:xfrm>
       </p:grpSpPr>
-      <p:pic>
-        <p:nvPicPr>
-          <p:cNvPr id="4" name="Content Placeholder 3"/>
-          <p:cNvPicPr>
-            <a:picLocks noGrp="1" noChangeAspect="1"/>
-          </p:cNvPicPr>
-          <p:nvPr>
-            <p:ph idx="1"/>
-          </p:nvPr>
-        </p:nvPicPr>
-        <p:blipFill rotWithShape="1">
-          <a:blip r:embed="rId2">
-            <a:extLst>
-              <a:ext uri="{28A0092B-C50C-407E-A947-70E740481C1C}">
-                <a14:useLocalDpi xmlns:a14="http://schemas.microsoft.com/office/drawing/2010/main" val="0"/>
-              </a:ext>
-            </a:extLst>
-          </a:blip>
-          <a:srcRect l="15581" t="12063" r="8680"/>
-          <a:stretch/>
-        </p:blipFill>
-        <p:spPr>
-          <a:xfrm>
-            <a:off x="3206906" y="172681"/>
-            <a:ext cx="7895755" cy="6574383"/>
-          </a:xfrm>
-        </p:spPr>
-      </p:pic>
-      <p:sp>
-        <p:nvSpPr>
-          <p:cNvPr id="2" name="TextBox 1"/>
-          <p:cNvSpPr txBox="1"/>
-          <p:nvPr/>
-        </p:nvSpPr>
-        <p:spPr>
-          <a:xfrm>
-            <a:off x="1505384" y="2422358"/>
-            <a:ext cx="827471" cy="1446550"/>
-          </a:xfrm>
-          <a:prstGeom prst="rect">
-            <a:avLst/>
-          </a:prstGeom>
-          <a:noFill/>
-        </p:spPr>
-        <p:txBody>
-          <a:bodyPr wrap="none" rtlCol="0">
-            <a:spAutoFit/>
-          </a:bodyPr>
-          <a:lstStyle/>
-          <a:p>
-            <a:r>
-              <a:rPr lang="en-US" sz="8800" dirty="0" smtClean="0"/>
-              <a:t>:(</a:t>
-            </a:r>
-            <a:endParaRPr lang="en-US" sz="8800" dirty="0"/>
+      <p:sp>
+        <p:nvSpPr>
+          <p:cNvPr id="2" name="Title 1"/>
+          <p:cNvSpPr>
+            <a:spLocks noGrp="1"/>
+          </p:cNvSpPr>
+          <p:nvPr>
+            <p:ph type="ctrTitle"/>
+          </p:nvPr>
+        </p:nvSpPr>
+        <p:spPr/>
+        <p:txBody>
+          <a:bodyPr/>
+          <a:lstStyle/>
+          <a:p>
+            <a:r>
+              <a:rPr lang="en-US" dirty="0" smtClean="0"/>
+              <a:t>Introduction to </a:t>
+            </a:r>
+            <a:r>
+              <a:rPr lang="en-US" dirty="0" err="1" smtClean="0"/>
+              <a:t>Git</a:t>
+            </a:r>
+            <a:endParaRPr lang="en-US" dirty="0"/>
+          </a:p>
+        </p:txBody>
+      </p:sp>
+      <p:sp>
+        <p:nvSpPr>
+          <p:cNvPr id="3" name="Subtitle 2"/>
+          <p:cNvSpPr>
+            <a:spLocks noGrp="1"/>
+          </p:cNvSpPr>
+          <p:nvPr>
+            <p:ph type="subTitle" idx="1"/>
+          </p:nvPr>
+        </p:nvSpPr>
+        <p:spPr/>
+        <p:txBody>
+          <a:bodyPr/>
+          <a:lstStyle/>
+          <a:p>
+            <a:r>
+              <a:rPr lang="en-US" dirty="0" smtClean="0"/>
+              <a:t>HILT </a:t>
+            </a:r>
+            <a:r>
+              <a:rPr lang="en-US" dirty="0" smtClean="0"/>
+              <a:t>2019</a:t>
+            </a:r>
+            <a:endParaRPr lang="en-US" dirty="0" smtClean="0"/>
+          </a:p>
+          <a:p>
+            <a:endParaRPr lang="en-US" dirty="0"/>
           </a:p>
         </p:txBody>
       </p:sp>
     </p:spTree>
     <p:extLst>
       <p:ext uri="{BB962C8B-B14F-4D97-AF65-F5344CB8AC3E}">
-        <p14:creationId xmlns:p14="http://schemas.microsoft.com/office/powerpoint/2010/main" val="1490363422"/>
+        <p14:creationId xmlns:p14="http://schemas.microsoft.com/office/powerpoint/2010/main" val="4066827190"/>
       </p:ext>
     </p:extLst>
   </p:cSld>
@@ -3570,69 +3586,79 @@
           <a:chExt cx="0" cy="0"/>
         </a:xfrm>
       </p:grpSpPr>
-      <p:pic>
-        <p:nvPicPr>
-          <p:cNvPr id="4" name="Content Placeholder 3"/>
-          <p:cNvPicPr>
-            <a:picLocks noGrp="1" noChangeAspect="1"/>
-          </p:cNvPicPr>
+      <p:sp>
+        <p:nvSpPr>
+          <p:cNvPr id="2" name="Title 1"/>
+          <p:cNvSpPr>
+            <a:spLocks noGrp="1"/>
+          </p:cNvSpPr>
+          <p:nvPr>
+            <p:ph type="title"/>
+          </p:nvPr>
+        </p:nvSpPr>
+        <p:spPr/>
+        <p:txBody>
+          <a:bodyPr/>
+          <a:lstStyle/>
+          <a:p>
+            <a:pPr algn="ctr"/>
+            <a:r>
+              <a:rPr lang="en-US" dirty="0" smtClean="0"/>
+              <a:t>Version Controlling</a:t>
+            </a:r>
+            <a:endParaRPr lang="en-US" dirty="0"/>
+          </a:p>
+        </p:txBody>
+      </p:sp>
+      <p:sp>
+        <p:nvSpPr>
+          <p:cNvPr id="3" name="Content Placeholder 2"/>
+          <p:cNvSpPr>
+            <a:spLocks noGrp="1"/>
+          </p:cNvSpPr>
           <p:nvPr>
             <p:ph idx="1"/>
           </p:nvPr>
-        </p:nvPicPr>
-        <p:blipFill>
-          <a:blip r:embed="rId2">
-            <a:extLst>
-              <a:ext uri="{28A0092B-C50C-407E-A947-70E740481C1C}">
-                <a14:useLocalDpi xmlns:a14="http://schemas.microsoft.com/office/drawing/2010/main" val="0"/>
-              </a:ext>
-            </a:extLst>
-          </a:blip>
-          <a:stretch>
-            <a:fillRect/>
-          </a:stretch>
-        </p:blipFill>
-        <p:spPr>
-          <a:xfrm>
-            <a:off x="3704883" y="105182"/>
-            <a:ext cx="6358600" cy="6571663"/>
-          </a:xfrm>
-        </p:spPr>
-      </p:pic>
-      <p:sp>
-        <p:nvSpPr>
-          <p:cNvPr id="3" name="TextBox 2"/>
-          <p:cNvSpPr txBox="1"/>
-          <p:nvPr/>
-        </p:nvSpPr>
-        <p:spPr>
-          <a:xfrm>
-            <a:off x="1505384" y="2422358"/>
-            <a:ext cx="827471" cy="1446550"/>
-          </a:xfrm>
-          <a:prstGeom prst="rect">
-            <a:avLst/>
-          </a:prstGeom>
-          <a:noFill/>
-        </p:spPr>
-        <p:txBody>
-          <a:bodyPr wrap="none" rtlCol="0">
-            <a:spAutoFit/>
+        </p:nvSpPr>
+        <p:spPr/>
+        <p:txBody>
+          <a:bodyPr>
+            <a:normAutofit/>
           </a:bodyPr>
           <a:lstStyle/>
           <a:p>
             <a:r>
-              <a:rPr lang="en-US" sz="8800" dirty="0" smtClean="0"/>
-              <a:t>:)</a:t>
-            </a:r>
-            <a:endParaRPr lang="en-US" sz="8800" dirty="0"/>
+              <a:rPr lang="en-US" sz="3600" dirty="0" smtClean="0"/>
+              <a:t>Save TONS of different versions of project over time.</a:t>
+            </a:r>
+          </a:p>
+          <a:p>
+            <a:r>
+              <a:rPr lang="en-US" sz="3600" dirty="0" smtClean="0"/>
+              <a:t>Can recover ANY of those iterations.</a:t>
+            </a:r>
+          </a:p>
+          <a:p>
+            <a:r>
+              <a:rPr lang="en-US" sz="3600" dirty="0" smtClean="0"/>
+              <a:t>Nothing is ever lost.</a:t>
+            </a:r>
+          </a:p>
+          <a:p>
+            <a:r>
+              <a:rPr lang="en-US" sz="3600" dirty="0" smtClean="0"/>
+              <a:t>The date, time, and extent of every change is logged (so is the person who made the changes).</a:t>
+            </a:r>
+          </a:p>
+          <a:p>
+            <a:endParaRPr lang="en-US" sz="3600" dirty="0"/>
           </a:p>
         </p:txBody>
       </p:sp>
     </p:spTree>
     <p:extLst>
       <p:ext uri="{BB962C8B-B14F-4D97-AF65-F5344CB8AC3E}">
-        <p14:creationId xmlns:p14="http://schemas.microsoft.com/office/powerpoint/2010/main" val="1151761814"/>
+        <p14:creationId xmlns:p14="http://schemas.microsoft.com/office/powerpoint/2010/main" val="2341958008"/>
       </p:ext>
     </p:extLst>
   </p:cSld>
@@ -3666,79 +3692,68 @@
           <a:chExt cx="0" cy="0"/>
         </a:xfrm>
       </p:grpSpPr>
-      <p:sp>
-        <p:nvSpPr>
-          <p:cNvPr id="2" name="Title 1"/>
-          <p:cNvSpPr>
-            <a:spLocks noGrp="1"/>
-          </p:cNvSpPr>
-          <p:nvPr>
-            <p:ph type="title"/>
-          </p:nvPr>
-        </p:nvSpPr>
-        <p:spPr/>
-        <p:txBody>
-          <a:bodyPr/>
-          <a:lstStyle/>
-          <a:p>
-            <a:pPr algn="ctr"/>
-            <a:r>
-              <a:rPr lang="en-US" dirty="0" err="1" smtClean="0"/>
-              <a:t>Git</a:t>
-            </a:r>
-            <a:endParaRPr lang="en-US" dirty="0"/>
-          </a:p>
-        </p:txBody>
-      </p:sp>
-      <p:sp>
-        <p:nvSpPr>
-          <p:cNvPr id="3" name="Content Placeholder 2"/>
-          <p:cNvSpPr>
-            <a:spLocks noGrp="1"/>
-          </p:cNvSpPr>
+      <p:pic>
+        <p:nvPicPr>
+          <p:cNvPr id="4" name="Content Placeholder 3"/>
+          <p:cNvPicPr>
+            <a:picLocks noGrp="1" noChangeAspect="1"/>
+          </p:cNvPicPr>
           <p:nvPr>
             <p:ph idx="1"/>
           </p:nvPr>
-        </p:nvSpPr>
-        <p:spPr/>
-        <p:txBody>
-          <a:bodyPr>
-            <a:normAutofit/>
+        </p:nvPicPr>
+        <p:blipFill rotWithShape="1">
+          <a:blip r:embed="rId2">
+            <a:extLst>
+              <a:ext uri="{28A0092B-C50C-407E-A947-70E740481C1C}">
+                <a14:useLocalDpi xmlns:a14="http://schemas.microsoft.com/office/drawing/2010/main" val="0"/>
+              </a:ext>
+            </a:extLst>
+          </a:blip>
+          <a:srcRect l="15581" t="12063" r="8680"/>
+          <a:stretch/>
+        </p:blipFill>
+        <p:spPr>
+          <a:xfrm>
+            <a:off x="3206906" y="172681"/>
+            <a:ext cx="7895755" cy="6574383"/>
+          </a:xfrm>
+        </p:spPr>
+      </p:pic>
+      <p:sp>
+        <p:nvSpPr>
+          <p:cNvPr id="2" name="TextBox 1"/>
+          <p:cNvSpPr txBox="1"/>
+          <p:nvPr/>
+        </p:nvSpPr>
+        <p:spPr>
+          <a:xfrm>
+            <a:off x="1505384" y="2422358"/>
+            <a:ext cx="827471" cy="1446550"/>
+          </a:xfrm>
+          <a:prstGeom prst="rect">
+            <a:avLst/>
+          </a:prstGeom>
+          <a:noFill/>
+        </p:spPr>
+        <p:txBody>
+          <a:bodyPr wrap="none" rtlCol="0">
+            <a:spAutoFit/>
           </a:bodyPr>
           <a:lstStyle/>
           <a:p>
             <a:r>
-              <a:rPr lang="en-US" sz="3600" dirty="0" smtClean="0"/>
-              <a:t>Distributed Version Control System.</a:t>
-            </a:r>
-          </a:p>
-          <a:p>
-            <a:r>
-              <a:rPr lang="en-US" sz="3600" dirty="0" smtClean="0"/>
-              <a:t>Each clone gets the entire project history.</a:t>
-            </a:r>
-          </a:p>
-          <a:p>
-            <a:r>
-              <a:rPr lang="en-US" sz="3600" dirty="0" smtClean="0"/>
-              <a:t>Code exists, in full, everywhere.</a:t>
-            </a:r>
-          </a:p>
-          <a:p>
-            <a:r>
-              <a:rPr lang="en-US" sz="3600" dirty="0" smtClean="0"/>
-              <a:t>Allows easy collaboration via GitHub.</a:t>
-            </a:r>
-          </a:p>
-          <a:p>
-            <a:endParaRPr lang="en-US" sz="3600" dirty="0"/>
+              <a:rPr lang="en-US" sz="8800" dirty="0" smtClean="0"/>
+              <a:t>:(</a:t>
+            </a:r>
+            <a:endParaRPr lang="en-US" sz="8800" dirty="0"/>
           </a:p>
         </p:txBody>
       </p:sp>
     </p:spTree>
     <p:extLst>
       <p:ext uri="{BB962C8B-B14F-4D97-AF65-F5344CB8AC3E}">
-        <p14:creationId xmlns:p14="http://schemas.microsoft.com/office/powerpoint/2010/main" val="2311746495"/>
+        <p14:creationId xmlns:p14="http://schemas.microsoft.com/office/powerpoint/2010/main" val="1490363422"/>
       </p:ext>
     </p:extLst>
   </p:cSld>
@@ -3772,6 +3787,208 @@
           <a:chExt cx="0" cy="0"/>
         </a:xfrm>
       </p:grpSpPr>
+      <p:pic>
+        <p:nvPicPr>
+          <p:cNvPr id="4" name="Content Placeholder 3"/>
+          <p:cNvPicPr>
+            <a:picLocks noGrp="1" noChangeAspect="1"/>
+          </p:cNvPicPr>
+          <p:nvPr>
+            <p:ph idx="1"/>
+          </p:nvPr>
+        </p:nvPicPr>
+        <p:blipFill>
+          <a:blip r:embed="rId2">
+            <a:extLst>
+              <a:ext uri="{28A0092B-C50C-407E-A947-70E740481C1C}">
+                <a14:useLocalDpi xmlns:a14="http://schemas.microsoft.com/office/drawing/2010/main" val="0"/>
+              </a:ext>
+            </a:extLst>
+          </a:blip>
+          <a:stretch>
+            <a:fillRect/>
+          </a:stretch>
+        </p:blipFill>
+        <p:spPr>
+          <a:xfrm>
+            <a:off x="3704883" y="105182"/>
+            <a:ext cx="6358600" cy="6571663"/>
+          </a:xfrm>
+        </p:spPr>
+      </p:pic>
+      <p:sp>
+        <p:nvSpPr>
+          <p:cNvPr id="3" name="TextBox 2"/>
+          <p:cNvSpPr txBox="1"/>
+          <p:nvPr/>
+        </p:nvSpPr>
+        <p:spPr>
+          <a:xfrm>
+            <a:off x="1505384" y="2422358"/>
+            <a:ext cx="827471" cy="1446550"/>
+          </a:xfrm>
+          <a:prstGeom prst="rect">
+            <a:avLst/>
+          </a:prstGeom>
+          <a:noFill/>
+        </p:spPr>
+        <p:txBody>
+          <a:bodyPr wrap="none" rtlCol="0">
+            <a:spAutoFit/>
+          </a:bodyPr>
+          <a:lstStyle/>
+          <a:p>
+            <a:r>
+              <a:rPr lang="en-US" sz="8800" dirty="0" smtClean="0"/>
+              <a:t>:)</a:t>
+            </a:r>
+            <a:endParaRPr lang="en-US" sz="8800" dirty="0"/>
+          </a:p>
+        </p:txBody>
+      </p:sp>
+    </p:spTree>
+    <p:extLst>
+      <p:ext uri="{BB962C8B-B14F-4D97-AF65-F5344CB8AC3E}">
+        <p14:creationId xmlns:p14="http://schemas.microsoft.com/office/powerpoint/2010/main" val="1151761814"/>
+      </p:ext>
+    </p:extLst>
+  </p:cSld>
+  <p:clrMapOvr>
+    <a:masterClrMapping/>
+  </p:clrMapOvr>
+  <p:timing>
+    <p:tnLst>
+      <p:par>
+        <p:cTn id="1" dur="indefinite" restart="never" nodeType="tmRoot"/>
+      </p:par>
+    </p:tnLst>
+  </p:timing>
+</p:sld>
+</file>
+
+<file path=ppt/slides/slide17.xml><?xml version="1.0" encoding="utf-8"?>
+<p:sld xmlns:a="http://schemas.openxmlformats.org/drawingml/2006/main" xmlns:r="http://schemas.openxmlformats.org/officeDocument/2006/relationships" xmlns:p="http://schemas.openxmlformats.org/presentationml/2006/main">
+  <p:cSld>
+    <p:spTree>
+      <p:nvGrpSpPr>
+        <p:cNvPr id="1" name=""/>
+        <p:cNvGrpSpPr/>
+        <p:nvPr/>
+      </p:nvGrpSpPr>
+      <p:grpSpPr>
+        <a:xfrm>
+          <a:off x="0" y="0"/>
+          <a:ext cx="0" cy="0"/>
+          <a:chOff x="0" y="0"/>
+          <a:chExt cx="0" cy="0"/>
+        </a:xfrm>
+      </p:grpSpPr>
+      <p:sp>
+        <p:nvSpPr>
+          <p:cNvPr id="2" name="Title 1"/>
+          <p:cNvSpPr>
+            <a:spLocks noGrp="1"/>
+          </p:cNvSpPr>
+          <p:nvPr>
+            <p:ph type="title"/>
+          </p:nvPr>
+        </p:nvSpPr>
+        <p:spPr/>
+        <p:txBody>
+          <a:bodyPr/>
+          <a:lstStyle/>
+          <a:p>
+            <a:pPr algn="ctr"/>
+            <a:r>
+              <a:rPr lang="en-US" dirty="0" err="1" smtClean="0"/>
+              <a:t>Git</a:t>
+            </a:r>
+            <a:endParaRPr lang="en-US" dirty="0"/>
+          </a:p>
+        </p:txBody>
+      </p:sp>
+      <p:sp>
+        <p:nvSpPr>
+          <p:cNvPr id="3" name="Content Placeholder 2"/>
+          <p:cNvSpPr>
+            <a:spLocks noGrp="1"/>
+          </p:cNvSpPr>
+          <p:nvPr>
+            <p:ph idx="1"/>
+          </p:nvPr>
+        </p:nvSpPr>
+        <p:spPr/>
+        <p:txBody>
+          <a:bodyPr>
+            <a:normAutofit/>
+          </a:bodyPr>
+          <a:lstStyle/>
+          <a:p>
+            <a:r>
+              <a:rPr lang="en-US" sz="3600" dirty="0" smtClean="0"/>
+              <a:t>Distributed Version Control System.</a:t>
+            </a:r>
+          </a:p>
+          <a:p>
+            <a:r>
+              <a:rPr lang="en-US" sz="3600" dirty="0" smtClean="0"/>
+              <a:t>Each clone gets the entire project history.</a:t>
+            </a:r>
+          </a:p>
+          <a:p>
+            <a:r>
+              <a:rPr lang="en-US" sz="3600" dirty="0" smtClean="0"/>
+              <a:t>Code exists, in full, everywhere.</a:t>
+            </a:r>
+          </a:p>
+          <a:p>
+            <a:r>
+              <a:rPr lang="en-US" sz="3600" dirty="0" smtClean="0"/>
+              <a:t>Allows easy collaboration via GitHub.</a:t>
+            </a:r>
+          </a:p>
+          <a:p>
+            <a:endParaRPr lang="en-US" sz="3600" dirty="0"/>
+          </a:p>
+        </p:txBody>
+      </p:sp>
+    </p:spTree>
+    <p:extLst>
+      <p:ext uri="{BB962C8B-B14F-4D97-AF65-F5344CB8AC3E}">
+        <p14:creationId xmlns:p14="http://schemas.microsoft.com/office/powerpoint/2010/main" val="2311746495"/>
+      </p:ext>
+    </p:extLst>
+  </p:cSld>
+  <p:clrMapOvr>
+    <a:masterClrMapping/>
+  </p:clrMapOvr>
+  <p:timing>
+    <p:tnLst>
+      <p:par>
+        <p:cTn id="1" dur="indefinite" restart="never" nodeType="tmRoot"/>
+      </p:par>
+    </p:tnLst>
+  </p:timing>
+</p:sld>
+</file>
+
+<file path=ppt/slides/slide18.xml><?xml version="1.0" encoding="utf-8"?>
+<p:sld xmlns:a="http://schemas.openxmlformats.org/drawingml/2006/main" xmlns:r="http://schemas.openxmlformats.org/officeDocument/2006/relationships" xmlns:p="http://schemas.openxmlformats.org/presentationml/2006/main">
+  <p:cSld>
+    <p:spTree>
+      <p:nvGrpSpPr>
+        <p:cNvPr id="1" name=""/>
+        <p:cNvGrpSpPr/>
+        <p:nvPr/>
+      </p:nvGrpSpPr>
+      <p:grpSpPr>
+        <a:xfrm>
+          <a:off x="0" y="0"/>
+          <a:ext cx="0" cy="0"/>
+          <a:chOff x="0" y="0"/>
+          <a:chExt cx="0" cy="0"/>
+        </a:xfrm>
+      </p:grpSpPr>
       <p:sp>
         <p:nvSpPr>
           <p:cNvPr id="2" name="Title 1"/>
@@ -3933,7 +4150,7 @@
 </p:sld>
 </file>
 
-<file path=ppt/slides/slide17.xml><?xml version="1.0" encoding="utf-8"?>
+<file path=ppt/slides/slide19.xml><?xml version="1.0" encoding="utf-8"?>
 <p:sld xmlns:a="http://schemas.openxmlformats.org/drawingml/2006/main" xmlns:r="http://schemas.openxmlformats.org/officeDocument/2006/relationships" xmlns:p="http://schemas.openxmlformats.org/presentationml/2006/main">
   <p:cSld>
     <p:spTree>
@@ -4361,7 +4578,250 @@
 </p:sld>
 </file>
 
-<file path=ppt/slides/slide18.xml><?xml version="1.0" encoding="utf-8"?>
+<file path=ppt/slides/slide2.xml><?xml version="1.0" encoding="utf-8"?>
+<p:sld xmlns:a="http://schemas.openxmlformats.org/drawingml/2006/main" xmlns:r="http://schemas.openxmlformats.org/officeDocument/2006/relationships" xmlns:p="http://schemas.openxmlformats.org/presentationml/2006/main">
+  <p:cSld>
+    <p:spTree>
+      <p:nvGrpSpPr>
+        <p:cNvPr id="1" name=""/>
+        <p:cNvGrpSpPr/>
+        <p:nvPr/>
+      </p:nvGrpSpPr>
+      <p:grpSpPr>
+        <a:xfrm>
+          <a:off x="0" y="0"/>
+          <a:ext cx="0" cy="0"/>
+          <a:chOff x="0" y="0"/>
+          <a:chExt cx="0" cy="0"/>
+        </a:xfrm>
+      </p:grpSpPr>
+      <p:sp>
+        <p:nvSpPr>
+          <p:cNvPr id="2" name="Title 1"/>
+          <p:cNvSpPr>
+            <a:spLocks noGrp="1"/>
+          </p:cNvSpPr>
+          <p:nvPr>
+            <p:ph type="title"/>
+          </p:nvPr>
+        </p:nvSpPr>
+        <p:spPr>
+          <a:xfrm>
+            <a:off x="838200" y="284915"/>
+            <a:ext cx="10515600" cy="6324433"/>
+          </a:xfrm>
+        </p:spPr>
+        <p:txBody>
+          <a:bodyPr>
+            <a:normAutofit/>
+          </a:bodyPr>
+          <a:lstStyle/>
+          <a:p>
+            <a:r>
+              <a:rPr lang="en-US" dirty="0" smtClean="0"/>
+              <a:t>Right now we will cover:</a:t>
+            </a:r>
+            <a:br>
+              <a:rPr lang="en-US" dirty="0" smtClean="0"/>
+            </a:br>
+            <a:r>
+              <a:rPr lang="en-US" dirty="0"/>
+              <a:t/>
+            </a:r>
+            <a:br>
+              <a:rPr lang="en-US" dirty="0"/>
+            </a:br>
+            <a:r>
+              <a:rPr lang="en-US" dirty="0" smtClean="0"/>
+              <a:t/>
+            </a:r>
+            <a:br>
+              <a:rPr lang="en-US" dirty="0" smtClean="0"/>
+            </a:br>
+            <a:r>
+              <a:rPr lang="en-US" dirty="0"/>
+              <a:t/>
+            </a:r>
+            <a:br>
+              <a:rPr lang="en-US" dirty="0"/>
+            </a:br>
+            <a:r>
+              <a:rPr lang="en-US" dirty="0" smtClean="0"/>
+              <a:t/>
+            </a:r>
+            <a:br>
+              <a:rPr lang="en-US" dirty="0" smtClean="0"/>
+            </a:br>
+            <a:r>
+              <a:rPr lang="en-US" dirty="0" smtClean="0"/>
+              <a:t>… and will gesture toward:</a:t>
+            </a:r>
+            <a:r>
+              <a:rPr lang="en-US" dirty="0"/>
+              <a:t/>
+            </a:r>
+            <a:br>
+              <a:rPr lang="en-US" dirty="0"/>
+            </a:br>
+            <a:r>
+              <a:rPr lang="en-US" dirty="0" smtClean="0"/>
+              <a:t/>
+            </a:r>
+            <a:br>
+              <a:rPr lang="en-US" dirty="0" smtClean="0"/>
+            </a:br>
+            <a:r>
+              <a:rPr lang="en-US" dirty="0" smtClean="0"/>
+              <a:t/>
+            </a:r>
+            <a:br>
+              <a:rPr lang="en-US" dirty="0" smtClean="0"/>
+            </a:br>
+            <a:endParaRPr lang="en-US" dirty="0"/>
+          </a:p>
+        </p:txBody>
+      </p:sp>
+      <p:sp>
+        <p:nvSpPr>
+          <p:cNvPr id="3" name="Content Placeholder 2"/>
+          <p:cNvSpPr>
+            <a:spLocks noGrp="1"/>
+          </p:cNvSpPr>
+          <p:nvPr>
+            <p:ph idx="1"/>
+          </p:nvPr>
+        </p:nvSpPr>
+        <p:spPr>
+          <a:xfrm>
+            <a:off x="1407543" y="1790909"/>
+            <a:ext cx="10515600" cy="4351338"/>
+          </a:xfrm>
+        </p:spPr>
+        <p:txBody>
+          <a:bodyPr/>
+          <a:lstStyle/>
+          <a:p>
+            <a:pPr marL="514350" indent="-514350">
+              <a:buFont typeface="+mj-lt"/>
+              <a:buAutoNum type="arabicPeriod"/>
+            </a:pPr>
+            <a:r>
+              <a:rPr lang="en-US" dirty="0" smtClean="0"/>
+              <a:t>What is the “command line interface”?</a:t>
+            </a:r>
+          </a:p>
+          <a:p>
+            <a:pPr marL="514350" indent="-514350">
+              <a:buFont typeface="+mj-lt"/>
+              <a:buAutoNum type="arabicPeriod"/>
+            </a:pPr>
+            <a:r>
+              <a:rPr lang="en-US" dirty="0" smtClean="0"/>
+              <a:t>How do I use it?</a:t>
+            </a:r>
+          </a:p>
+          <a:p>
+            <a:pPr marL="514350" indent="-514350">
+              <a:buFont typeface="+mj-lt"/>
+              <a:buAutoNum type="arabicPeriod"/>
+            </a:pPr>
+            <a:endParaRPr lang="en-US" dirty="0"/>
+          </a:p>
+          <a:p>
+            <a:pPr marL="514350" indent="-514350">
+              <a:buFont typeface="+mj-lt"/>
+              <a:buAutoNum type="arabicPeriod"/>
+            </a:pPr>
+            <a:endParaRPr lang="en-US" dirty="0" smtClean="0"/>
+          </a:p>
+          <a:p>
+            <a:pPr marL="514350" indent="-514350">
+              <a:buFont typeface="+mj-lt"/>
+              <a:buAutoNum type="arabicPeriod"/>
+            </a:pPr>
+            <a:endParaRPr lang="en-US" dirty="0"/>
+          </a:p>
+          <a:p>
+            <a:pPr marL="514350" indent="-514350">
+              <a:buFont typeface="+mj-lt"/>
+              <a:buAutoNum type="arabicPeriod"/>
+            </a:pPr>
+            <a:endParaRPr lang="en-US" dirty="0" smtClean="0"/>
+          </a:p>
+          <a:p>
+            <a:pPr marL="514350" indent="-514350">
+              <a:buFont typeface="+mj-lt"/>
+              <a:buAutoNum type="arabicPeriod"/>
+            </a:pPr>
+            <a:r>
+              <a:rPr lang="en-US" dirty="0" smtClean="0"/>
+              <a:t>WHY would I use it?</a:t>
+            </a:r>
+          </a:p>
+          <a:p>
+            <a:endParaRPr lang="en-US" dirty="0"/>
+          </a:p>
+        </p:txBody>
+      </p:sp>
+      <p:sp>
+        <p:nvSpPr>
+          <p:cNvPr id="4" name="Title 1"/>
+          <p:cNvSpPr txBox="1">
+            <a:spLocks/>
+          </p:cNvSpPr>
+          <p:nvPr/>
+        </p:nvSpPr>
+        <p:spPr>
+          <a:xfrm>
+            <a:off x="320843" y="465346"/>
+            <a:ext cx="5658852" cy="1325563"/>
+          </a:xfrm>
+          <a:prstGeom prst="rect">
+            <a:avLst/>
+          </a:prstGeom>
+        </p:spPr>
+        <p:txBody>
+          <a:bodyPr vert="horz" lIns="91440" tIns="45720" rIns="91440" bIns="45720" rtlCol="0" anchor="ctr">
+            <a:normAutofit/>
+          </a:bodyPr>
+          <a:lstStyle>
+            <a:lvl1pPr algn="l" defTabSz="914400" rtl="0" eaLnBrk="1" latinLnBrk="0" hangingPunct="1">
+              <a:lnSpc>
+                <a:spcPct val="90000"/>
+              </a:lnSpc>
+              <a:spcBef>
+                <a:spcPct val="0"/>
+              </a:spcBef>
+              <a:buNone/>
+              <a:defRPr sz="4400" kern="1200">
+                <a:solidFill>
+                  <a:schemeClr val="tx1"/>
+                </a:solidFill>
+                <a:latin typeface="+mj-lt"/>
+                <a:ea typeface="+mj-ea"/>
+                <a:cs typeface="+mj-cs"/>
+              </a:defRPr>
+            </a:lvl1pPr>
+          </a:lstStyle>
+          <a:p>
+            <a:endParaRPr lang="en-US" sz="4000" dirty="0"/>
+          </a:p>
+        </p:txBody>
+      </p:sp>
+    </p:spTree>
+    <p:extLst>
+      <p:ext uri="{BB962C8B-B14F-4D97-AF65-F5344CB8AC3E}">
+        <p14:creationId xmlns:p14="http://schemas.microsoft.com/office/powerpoint/2010/main" val="819911350"/>
+      </p:ext>
+    </p:extLst>
+  </p:cSld>
+  <p:clrMapOvr>
+    <a:masterClrMapping/>
+  </p:clrMapOvr>
+</p:sld>
+</file>
+
+<file path=ppt/slides/slide20.xml><?xml version="1.0" encoding="utf-8"?>
 <p:sld xmlns:a="http://schemas.openxmlformats.org/drawingml/2006/main" xmlns:r="http://schemas.openxmlformats.org/officeDocument/2006/relationships" xmlns:p="http://schemas.openxmlformats.org/presentationml/2006/main">
   <p:cSld>
     <p:spTree>
@@ -4427,7 +4887,7 @@
 </p:sld>
 </file>
 
-<file path=ppt/slides/slide19.xml><?xml version="1.0" encoding="utf-8"?>
+<file path=ppt/slides/slide21.xml><?xml version="1.0" encoding="utf-8"?>
 <p:sld xmlns:a="http://schemas.openxmlformats.org/drawingml/2006/main" xmlns:r="http://schemas.openxmlformats.org/officeDocument/2006/relationships" xmlns:p="http://schemas.openxmlformats.org/presentationml/2006/main">
   <p:cSld>
     <p:spTree>
@@ -4542,158 +5002,7 @@
 </p:sld>
 </file>
 
-<file path=ppt/slides/slide2.xml><?xml version="1.0" encoding="utf-8"?>
-<p:sld xmlns:a="http://schemas.openxmlformats.org/drawingml/2006/main" xmlns:r="http://schemas.openxmlformats.org/officeDocument/2006/relationships" xmlns:p="http://schemas.openxmlformats.org/presentationml/2006/main">
-  <p:cSld>
-    <p:spTree>
-      <p:nvGrpSpPr>
-        <p:cNvPr id="1" name=""/>
-        <p:cNvGrpSpPr/>
-        <p:nvPr/>
-      </p:nvGrpSpPr>
-      <p:grpSpPr>
-        <a:xfrm>
-          <a:off x="0" y="0"/>
-          <a:ext cx="0" cy="0"/>
-          <a:chOff x="0" y="0"/>
-          <a:chExt cx="0" cy="0"/>
-        </a:xfrm>
-      </p:grpSpPr>
-      <p:pic>
-        <p:nvPicPr>
-          <p:cNvPr id="4" name="Picture 3"/>
-          <p:cNvPicPr>
-            <a:picLocks noChangeAspect="1"/>
-          </p:cNvPicPr>
-          <p:nvPr/>
-        </p:nvPicPr>
-        <p:blipFill>
-          <a:blip r:embed="rId2"/>
-          <a:stretch>
-            <a:fillRect/>
-          </a:stretch>
-        </p:blipFill>
-        <p:spPr>
-          <a:xfrm>
-            <a:off x="366941" y="229441"/>
-            <a:ext cx="4242278" cy="6628559"/>
-          </a:xfrm>
-          <a:prstGeom prst="rect">
-            <a:avLst/>
-          </a:prstGeom>
-        </p:spPr>
-      </p:pic>
-      <p:sp>
-        <p:nvSpPr>
-          <p:cNvPr id="5" name="TextBox 4"/>
-          <p:cNvSpPr txBox="1"/>
-          <p:nvPr/>
-        </p:nvSpPr>
-        <p:spPr>
-          <a:xfrm>
-            <a:off x="5651298" y="1010654"/>
-            <a:ext cx="4641207" cy="769441"/>
-          </a:xfrm>
-          <a:prstGeom prst="rect">
-            <a:avLst/>
-          </a:prstGeom>
-          <a:noFill/>
-        </p:spPr>
-        <p:txBody>
-          <a:bodyPr wrap="none" rtlCol="0">
-            <a:spAutoFit/>
-          </a:bodyPr>
-          <a:lstStyle/>
-          <a:p>
-            <a:r>
-              <a:rPr lang="en-US" sz="4400" dirty="0" smtClean="0"/>
-              <a:t>Programming Rules</a:t>
-            </a:r>
-            <a:endParaRPr lang="en-US" sz="4400" dirty="0"/>
-          </a:p>
-        </p:txBody>
-      </p:sp>
-      <p:sp>
-        <p:nvSpPr>
-          <p:cNvPr id="6" name="TextBox 5"/>
-          <p:cNvSpPr txBox="1"/>
-          <p:nvPr/>
-        </p:nvSpPr>
-        <p:spPr>
-          <a:xfrm>
-            <a:off x="5574632" y="2350168"/>
-            <a:ext cx="4598503" cy="2554545"/>
-          </a:xfrm>
-          <a:prstGeom prst="rect">
-            <a:avLst/>
-          </a:prstGeom>
-          <a:noFill/>
-        </p:spPr>
-        <p:txBody>
-          <a:bodyPr wrap="none" rtlCol="0">
-            <a:spAutoFit/>
-          </a:bodyPr>
-          <a:lstStyle/>
-          <a:p>
-            <a:pPr marL="742950" indent="-742950">
-              <a:buAutoNum type="arabicPeriod"/>
-            </a:pPr>
-            <a:r>
-              <a:rPr lang="en-US" sz="4000" dirty="0" smtClean="0"/>
-              <a:t>Expect confusion.</a:t>
-            </a:r>
-          </a:p>
-          <a:p>
-            <a:pPr marL="742950" indent="-742950">
-              <a:buAutoNum type="arabicPeriod"/>
-            </a:pPr>
-            <a:r>
-              <a:rPr lang="en-US" sz="4000" dirty="0" smtClean="0"/>
-              <a:t>Embrace it!</a:t>
-            </a:r>
-          </a:p>
-          <a:p>
-            <a:pPr marL="742950" indent="-742950">
-              <a:buAutoNum type="arabicPeriod"/>
-            </a:pPr>
-            <a:r>
-              <a:rPr lang="en-US" sz="4000" dirty="0" smtClean="0"/>
-              <a:t>Ask questions.</a:t>
-            </a:r>
-          </a:p>
-          <a:p>
-            <a:pPr marL="742950" indent="-742950">
-              <a:buAutoNum type="arabicPeriod"/>
-            </a:pPr>
-            <a:r>
-              <a:rPr lang="en-US" sz="4000" dirty="0" smtClean="0"/>
-              <a:t>Look online!</a:t>
-            </a:r>
-            <a:endParaRPr lang="en-US" sz="4000" dirty="0"/>
-          </a:p>
-        </p:txBody>
-      </p:sp>
-    </p:spTree>
-    <p:extLst>
-      <p:ext uri="{BB962C8B-B14F-4D97-AF65-F5344CB8AC3E}">
-        <p14:creationId xmlns:p14="http://schemas.microsoft.com/office/powerpoint/2010/main" val="2625601115"/>
-      </p:ext>
-    </p:extLst>
-  </p:cSld>
-  <p:clrMapOvr>
-    <a:masterClrMapping/>
-  </p:clrMapOvr>
-  <p:timing>
-    <p:tnLst>
-      <p:par>
-        <p:cTn id="1" dur="indefinite" restart="never" nodeType="tmRoot"/>
-      </p:par>
-    </p:tnLst>
-  </p:timing>
-</p:sld>
-</file>
-
-<file path=ppt/slides/slide20.xml><?xml version="1.0" encoding="utf-8"?>
+<file path=ppt/slides/slide22.xml><?xml version="1.0" encoding="utf-8"?>
 <p:sld xmlns:a="http://schemas.openxmlformats.org/drawingml/2006/main" xmlns:r="http://schemas.openxmlformats.org/officeDocument/2006/relationships" xmlns:p="http://schemas.openxmlformats.org/presentationml/2006/main">
   <p:cSld>
     <p:spTree>
@@ -4812,7 +5121,7 @@
 </p:sld>
 </file>
 
-<file path=ppt/slides/slide21.xml><?xml version="1.0" encoding="utf-8"?>
+<file path=ppt/slides/slide23.xml><?xml version="1.0" encoding="utf-8"?>
 <p:sld xmlns:a="http://schemas.openxmlformats.org/drawingml/2006/main" xmlns:r="http://schemas.openxmlformats.org/officeDocument/2006/relationships" xmlns:p="http://schemas.openxmlformats.org/presentationml/2006/main">
   <p:cSld>
     <p:spTree>
@@ -5060,6 +5369,157 @@
 </file>
 
 <file path=ppt/slides/slide3.xml><?xml version="1.0" encoding="utf-8"?>
+<p:sld xmlns:a="http://schemas.openxmlformats.org/drawingml/2006/main" xmlns:r="http://schemas.openxmlformats.org/officeDocument/2006/relationships" xmlns:p="http://schemas.openxmlformats.org/presentationml/2006/main">
+  <p:cSld>
+    <p:spTree>
+      <p:nvGrpSpPr>
+        <p:cNvPr id="1" name=""/>
+        <p:cNvGrpSpPr/>
+        <p:nvPr/>
+      </p:nvGrpSpPr>
+      <p:grpSpPr>
+        <a:xfrm>
+          <a:off x="0" y="0"/>
+          <a:ext cx="0" cy="0"/>
+          <a:chOff x="0" y="0"/>
+          <a:chExt cx="0" cy="0"/>
+        </a:xfrm>
+      </p:grpSpPr>
+      <p:pic>
+        <p:nvPicPr>
+          <p:cNvPr id="4" name="Picture 3"/>
+          <p:cNvPicPr>
+            <a:picLocks noChangeAspect="1"/>
+          </p:cNvPicPr>
+          <p:nvPr/>
+        </p:nvPicPr>
+        <p:blipFill>
+          <a:blip r:embed="rId2"/>
+          <a:stretch>
+            <a:fillRect/>
+          </a:stretch>
+        </p:blipFill>
+        <p:spPr>
+          <a:xfrm>
+            <a:off x="366941" y="229441"/>
+            <a:ext cx="4242278" cy="6628559"/>
+          </a:xfrm>
+          <a:prstGeom prst="rect">
+            <a:avLst/>
+          </a:prstGeom>
+        </p:spPr>
+      </p:pic>
+      <p:sp>
+        <p:nvSpPr>
+          <p:cNvPr id="5" name="TextBox 4"/>
+          <p:cNvSpPr txBox="1"/>
+          <p:nvPr/>
+        </p:nvSpPr>
+        <p:spPr>
+          <a:xfrm>
+            <a:off x="5651298" y="1010654"/>
+            <a:ext cx="4641207" cy="769441"/>
+          </a:xfrm>
+          <a:prstGeom prst="rect">
+            <a:avLst/>
+          </a:prstGeom>
+          <a:noFill/>
+        </p:spPr>
+        <p:txBody>
+          <a:bodyPr wrap="none" rtlCol="0">
+            <a:spAutoFit/>
+          </a:bodyPr>
+          <a:lstStyle/>
+          <a:p>
+            <a:r>
+              <a:rPr lang="en-US" sz="4400" dirty="0" smtClean="0"/>
+              <a:t>Programming Rules</a:t>
+            </a:r>
+            <a:endParaRPr lang="en-US" sz="4400" dirty="0"/>
+          </a:p>
+        </p:txBody>
+      </p:sp>
+      <p:sp>
+        <p:nvSpPr>
+          <p:cNvPr id="6" name="TextBox 5"/>
+          <p:cNvSpPr txBox="1"/>
+          <p:nvPr/>
+        </p:nvSpPr>
+        <p:spPr>
+          <a:xfrm>
+            <a:off x="5574632" y="2350168"/>
+            <a:ext cx="4598503" cy="2554545"/>
+          </a:xfrm>
+          <a:prstGeom prst="rect">
+            <a:avLst/>
+          </a:prstGeom>
+          <a:noFill/>
+        </p:spPr>
+        <p:txBody>
+          <a:bodyPr wrap="none" rtlCol="0">
+            <a:spAutoFit/>
+          </a:bodyPr>
+          <a:lstStyle/>
+          <a:p>
+            <a:pPr marL="742950" indent="-742950">
+              <a:buAutoNum type="arabicPeriod"/>
+            </a:pPr>
+            <a:r>
+              <a:rPr lang="en-US" sz="4000" dirty="0" smtClean="0"/>
+              <a:t>Expect confusion.</a:t>
+            </a:r>
+          </a:p>
+          <a:p>
+            <a:pPr marL="742950" indent="-742950">
+              <a:buAutoNum type="arabicPeriod"/>
+            </a:pPr>
+            <a:r>
+              <a:rPr lang="en-US" sz="4000" dirty="0" smtClean="0"/>
+              <a:t>Embrace it!</a:t>
+            </a:r>
+          </a:p>
+          <a:p>
+            <a:pPr marL="742950" indent="-742950">
+              <a:buAutoNum type="arabicPeriod"/>
+            </a:pPr>
+            <a:r>
+              <a:rPr lang="en-US" sz="4000" dirty="0" smtClean="0"/>
+              <a:t>Ask questions.</a:t>
+            </a:r>
+          </a:p>
+          <a:p>
+            <a:pPr marL="742950" indent="-742950">
+              <a:buAutoNum type="arabicPeriod"/>
+            </a:pPr>
+            <a:r>
+              <a:rPr lang="en-US" sz="4000" dirty="0" smtClean="0"/>
+              <a:t>Look online!</a:t>
+            </a:r>
+            <a:endParaRPr lang="en-US" sz="4000" dirty="0"/>
+          </a:p>
+        </p:txBody>
+      </p:sp>
+    </p:spTree>
+    <p:extLst>
+      <p:ext uri="{BB962C8B-B14F-4D97-AF65-F5344CB8AC3E}">
+        <p14:creationId xmlns:p14="http://schemas.microsoft.com/office/powerpoint/2010/main" val="2625601115"/>
+      </p:ext>
+    </p:extLst>
+  </p:cSld>
+  <p:clrMapOvr>
+    <a:masterClrMapping/>
+  </p:clrMapOvr>
+  <p:timing>
+    <p:tnLst>
+      <p:par>
+        <p:cTn id="1" dur="indefinite" restart="never" nodeType="tmRoot"/>
+      </p:par>
+    </p:tnLst>
+  </p:timing>
+</p:sld>
+</file>
+
+<file path=ppt/slides/slide4.xml><?xml version="1.0" encoding="utf-8"?>
 <p:sld xmlns:a="http://schemas.openxmlformats.org/drawingml/2006/main" xmlns:r="http://schemas.openxmlformats.org/officeDocument/2006/relationships" xmlns:p="http://schemas.openxmlformats.org/presentationml/2006/main">
   <p:cSld>
     <p:spTree>
@@ -5125,7 +5585,7 @@
 </p:sld>
 </file>
 
-<file path=ppt/slides/slide4.xml><?xml version="1.0" encoding="utf-8"?>
+<file path=ppt/slides/slide5.xml><?xml version="1.0" encoding="utf-8"?>
 <p:sld xmlns:a="http://schemas.openxmlformats.org/drawingml/2006/main" xmlns:r="http://schemas.openxmlformats.org/officeDocument/2006/relationships" xmlns:p="http://schemas.openxmlformats.org/presentationml/2006/main">
   <p:cSld>
     <p:spTree>
@@ -5282,7 +5742,7 @@
 </p:sld>
 </file>
 
-<file path=ppt/slides/slide5.xml><?xml version="1.0" encoding="utf-8"?>
+<file path=ppt/slides/slide6.xml><?xml version="1.0" encoding="utf-8"?>
 <p:sld xmlns:a="http://schemas.openxmlformats.org/drawingml/2006/main" xmlns:r="http://schemas.openxmlformats.org/officeDocument/2006/relationships" xmlns:p="http://schemas.openxmlformats.org/presentationml/2006/main">
   <p:cSld>
     <p:spTree>
@@ -5379,7 +5839,7 @@
 </p:sld>
 </file>
 
-<file path=ppt/slides/slide6.xml><?xml version="1.0" encoding="utf-8"?>
+<file path=ppt/slides/slide7.xml><?xml version="1.0" encoding="utf-8"?>
 <p:sld xmlns:a="http://schemas.openxmlformats.org/drawingml/2006/main" xmlns:r="http://schemas.openxmlformats.org/officeDocument/2006/relationships" xmlns:p="http://schemas.openxmlformats.org/presentationml/2006/main">
   <p:cSld>
     <p:spTree>
@@ -5483,7 +5943,7 @@
 </p:sld>
 </file>
 
-<file path=ppt/slides/slide7.xml><?xml version="1.0" encoding="utf-8"?>
+<file path=ppt/slides/slide8.xml><?xml version="1.0" encoding="utf-8"?>
 <p:sld xmlns:a="http://schemas.openxmlformats.org/drawingml/2006/main" xmlns:r="http://schemas.openxmlformats.org/officeDocument/2006/relationships" xmlns:p="http://schemas.openxmlformats.org/presentationml/2006/main">
   <p:cSld>
     <p:spTree>
@@ -6233,7 +6693,7 @@
 </p:sld>
 </file>
 
-<file path=ppt/slides/slide8.xml><?xml version="1.0" encoding="utf-8"?>
+<file path=ppt/slides/slide9.xml><?xml version="1.0" encoding="utf-8"?>
 <p:sld xmlns:a="http://schemas.openxmlformats.org/drawingml/2006/main" xmlns:r="http://schemas.openxmlformats.org/officeDocument/2006/relationships" xmlns:p="http://schemas.openxmlformats.org/presentationml/2006/main">
   <p:cSld>
     <p:spTree>
@@ -6327,122 +6787,6 @@
     <p:extLst>
       <p:ext uri="{BB962C8B-B14F-4D97-AF65-F5344CB8AC3E}">
         <p14:creationId xmlns:p14="http://schemas.microsoft.com/office/powerpoint/2010/main" val="4285280753"/>
-      </p:ext>
-    </p:extLst>
-  </p:cSld>
-  <p:clrMapOvr>
-    <a:masterClrMapping/>
-  </p:clrMapOvr>
-  <p:timing>
-    <p:tnLst>
-      <p:par>
-        <p:cTn id="1" dur="indefinite" restart="never" nodeType="tmRoot"/>
-      </p:par>
-    </p:tnLst>
-  </p:timing>
-</p:sld>
-</file>
-
-<file path=ppt/slides/slide9.xml><?xml version="1.0" encoding="utf-8"?>
-<p:sld xmlns:a="http://schemas.openxmlformats.org/drawingml/2006/main" xmlns:r="http://schemas.openxmlformats.org/officeDocument/2006/relationships" xmlns:p="http://schemas.openxmlformats.org/presentationml/2006/main">
-  <p:cSld>
-    <p:spTree>
-      <p:nvGrpSpPr>
-        <p:cNvPr id="1" name=""/>
-        <p:cNvGrpSpPr/>
-        <p:nvPr/>
-      </p:nvGrpSpPr>
-      <p:grpSpPr>
-        <a:xfrm>
-          <a:off x="0" y="0"/>
-          <a:ext cx="0" cy="0"/>
-          <a:chOff x="0" y="0"/>
-          <a:chExt cx="0" cy="0"/>
-        </a:xfrm>
-      </p:grpSpPr>
-      <p:sp>
-        <p:nvSpPr>
-          <p:cNvPr id="6" name="Title 1"/>
-          <p:cNvSpPr txBox="1">
-            <a:spLocks/>
-          </p:cNvSpPr>
-          <p:nvPr/>
-        </p:nvSpPr>
-        <p:spPr>
-          <a:xfrm>
-            <a:off x="3176337" y="-481847"/>
-            <a:ext cx="9144000" cy="2387600"/>
-          </a:xfrm>
-          <a:prstGeom prst="rect">
-            <a:avLst/>
-          </a:prstGeom>
-        </p:spPr>
-        <p:txBody>
-          <a:bodyPr vert="horz" lIns="91440" tIns="45720" rIns="91440" bIns="45720" rtlCol="0" anchor="ctr">
-            <a:normAutofit/>
-          </a:bodyPr>
-          <a:lstStyle>
-            <a:lvl1pPr algn="l" defTabSz="914400" rtl="0" eaLnBrk="1" latinLnBrk="0" hangingPunct="1">
-              <a:lnSpc>
-                <a:spcPct val="90000"/>
-              </a:lnSpc>
-              <a:spcBef>
-                <a:spcPct val="0"/>
-              </a:spcBef>
-              <a:buNone/>
-              <a:defRPr sz="4400" kern="1200">
-                <a:solidFill>
-                  <a:schemeClr val="tx1"/>
-                </a:solidFill>
-                <a:latin typeface="+mj-lt"/>
-                <a:ea typeface="+mj-ea"/>
-                <a:cs typeface="+mj-cs"/>
-              </a:defRPr>
-            </a:lvl1pPr>
-          </a:lstStyle>
-          <a:p>
-            <a:r>
-              <a:rPr lang="en-US" dirty="0" smtClean="0"/>
-              <a:t>With great power….</a:t>
-            </a:r>
-            <a:endParaRPr lang="en-US" dirty="0"/>
-          </a:p>
-        </p:txBody>
-      </p:sp>
-      <p:pic>
-        <p:nvPicPr>
-          <p:cNvPr id="3" name="Picture 2"/>
-          <p:cNvPicPr>
-            <a:picLocks noChangeAspect="1"/>
-          </p:cNvPicPr>
-          <p:nvPr/>
-        </p:nvPicPr>
-        <p:blipFill>
-          <a:blip r:embed="rId2">
-            <a:extLst>
-              <a:ext uri="{28A0092B-C50C-407E-A947-70E740481C1C}">
-                <a14:useLocalDpi xmlns:a14="http://schemas.microsoft.com/office/drawing/2010/main" val="0"/>
-              </a:ext>
-            </a:extLst>
-          </a:blip>
-          <a:stretch>
-            <a:fillRect/>
-          </a:stretch>
-        </p:blipFill>
-        <p:spPr>
-          <a:xfrm>
-            <a:off x="1138988" y="1299411"/>
-            <a:ext cx="9596437" cy="4952999"/>
-          </a:xfrm>
-          <a:prstGeom prst="rect">
-            <a:avLst/>
-          </a:prstGeom>
-        </p:spPr>
-      </p:pic>
-    </p:spTree>
-    <p:extLst>
-      <p:ext uri="{BB962C8B-B14F-4D97-AF65-F5344CB8AC3E}">
-        <p14:creationId xmlns:p14="http://schemas.microsoft.com/office/powerpoint/2010/main" val="1779352926"/>
       </p:ext>
     </p:extLst>
   </p:cSld>

</xml_diff>

<commit_message>
Updated CLI and Git slides with a new image and a contextualizing slide for Git.
</commit_message>
<xml_diff>
--- a/2019/misc/CLI Git.pptx
+++ b/2019/misc/CLI Git.pptx
@@ -12,22 +12,23 @@
     <p:sldId id="258" r:id="rId6"/>
     <p:sldId id="259" r:id="rId7"/>
     <p:sldId id="261" r:id="rId8"/>
-    <p:sldId id="263" r:id="rId9"/>
-    <p:sldId id="268" r:id="rId10"/>
-    <p:sldId id="282" r:id="rId11"/>
-    <p:sldId id="286" r:id="rId12"/>
+    <p:sldId id="286" r:id="rId9"/>
+    <p:sldId id="263" r:id="rId10"/>
+    <p:sldId id="268" r:id="rId11"/>
+    <p:sldId id="282" r:id="rId12"/>
     <p:sldId id="264" r:id="rId13"/>
     <p:sldId id="269" r:id="rId14"/>
-    <p:sldId id="271" r:id="rId15"/>
-    <p:sldId id="273" r:id="rId16"/>
-    <p:sldId id="274" r:id="rId17"/>
-    <p:sldId id="272" r:id="rId18"/>
-    <p:sldId id="275" r:id="rId19"/>
-    <p:sldId id="277" r:id="rId20"/>
-    <p:sldId id="283" r:id="rId21"/>
-    <p:sldId id="278" r:id="rId22"/>
-    <p:sldId id="279" r:id="rId23"/>
-    <p:sldId id="281" r:id="rId24"/>
+    <p:sldId id="287" r:id="rId15"/>
+    <p:sldId id="271" r:id="rId16"/>
+    <p:sldId id="273" r:id="rId17"/>
+    <p:sldId id="274" r:id="rId18"/>
+    <p:sldId id="272" r:id="rId19"/>
+    <p:sldId id="275" r:id="rId20"/>
+    <p:sldId id="277" r:id="rId21"/>
+    <p:sldId id="283" r:id="rId22"/>
+    <p:sldId id="278" r:id="rId23"/>
+    <p:sldId id="279" r:id="rId24"/>
+    <p:sldId id="281" r:id="rId25"/>
   </p:sldIdLst>
   <p:sldSz cx="12192000" cy="6858000"/>
   <p:notesSz cx="6858000" cy="9144000"/>
@@ -291,7 +292,7 @@
           <a:p>
             <a:fld id="{F4EAFB54-7980-41A8-B151-9D25B292734F}" type="datetimeFigureOut">
               <a:rPr lang="en-US" smtClean="0"/>
-              <a:t>5/22/2019</a:t>
+              <a:t>5/23/2019</a:t>
             </a:fld>
             <a:endParaRPr lang="en-US"/>
           </a:p>
@@ -461,7 +462,7 @@
           <a:p>
             <a:fld id="{F4EAFB54-7980-41A8-B151-9D25B292734F}" type="datetimeFigureOut">
               <a:rPr lang="en-US" smtClean="0"/>
-              <a:t>5/22/2019</a:t>
+              <a:t>5/23/2019</a:t>
             </a:fld>
             <a:endParaRPr lang="en-US"/>
           </a:p>
@@ -641,7 +642,7 @@
           <a:p>
             <a:fld id="{F4EAFB54-7980-41A8-B151-9D25B292734F}" type="datetimeFigureOut">
               <a:rPr lang="en-US" smtClean="0"/>
-              <a:t>5/22/2019</a:t>
+              <a:t>5/23/2019</a:t>
             </a:fld>
             <a:endParaRPr lang="en-US"/>
           </a:p>
@@ -811,7 +812,7 @@
           <a:p>
             <a:fld id="{F4EAFB54-7980-41A8-B151-9D25B292734F}" type="datetimeFigureOut">
               <a:rPr lang="en-US" smtClean="0"/>
-              <a:t>5/22/2019</a:t>
+              <a:t>5/23/2019</a:t>
             </a:fld>
             <a:endParaRPr lang="en-US"/>
           </a:p>
@@ -1057,7 +1058,7 @@
           <a:p>
             <a:fld id="{F4EAFB54-7980-41A8-B151-9D25B292734F}" type="datetimeFigureOut">
               <a:rPr lang="en-US" smtClean="0"/>
-              <a:t>5/22/2019</a:t>
+              <a:t>5/23/2019</a:t>
             </a:fld>
             <a:endParaRPr lang="en-US"/>
           </a:p>
@@ -1289,7 +1290,7 @@
           <a:p>
             <a:fld id="{F4EAFB54-7980-41A8-B151-9D25B292734F}" type="datetimeFigureOut">
               <a:rPr lang="en-US" smtClean="0"/>
-              <a:t>5/22/2019</a:t>
+              <a:t>5/23/2019</a:t>
             </a:fld>
             <a:endParaRPr lang="en-US"/>
           </a:p>
@@ -1656,7 +1657,7 @@
           <a:p>
             <a:fld id="{F4EAFB54-7980-41A8-B151-9D25B292734F}" type="datetimeFigureOut">
               <a:rPr lang="en-US" smtClean="0"/>
-              <a:t>5/22/2019</a:t>
+              <a:t>5/23/2019</a:t>
             </a:fld>
             <a:endParaRPr lang="en-US"/>
           </a:p>
@@ -1774,7 +1775,7 @@
           <a:p>
             <a:fld id="{F4EAFB54-7980-41A8-B151-9D25B292734F}" type="datetimeFigureOut">
               <a:rPr lang="en-US" smtClean="0"/>
-              <a:t>5/22/2019</a:t>
+              <a:t>5/23/2019</a:t>
             </a:fld>
             <a:endParaRPr lang="en-US"/>
           </a:p>
@@ -1869,7 +1870,7 @@
           <a:p>
             <a:fld id="{F4EAFB54-7980-41A8-B151-9D25B292734F}" type="datetimeFigureOut">
               <a:rPr lang="en-US" smtClean="0"/>
-              <a:t>5/22/2019</a:t>
+              <a:t>5/23/2019</a:t>
             </a:fld>
             <a:endParaRPr lang="en-US"/>
           </a:p>
@@ -2146,7 +2147,7 @@
           <a:p>
             <a:fld id="{F4EAFB54-7980-41A8-B151-9D25B292734F}" type="datetimeFigureOut">
               <a:rPr lang="en-US" smtClean="0"/>
-              <a:t>5/22/2019</a:t>
+              <a:t>5/23/2019</a:t>
             </a:fld>
             <a:endParaRPr lang="en-US"/>
           </a:p>
@@ -2399,7 +2400,7 @@
           <a:p>
             <a:fld id="{F4EAFB54-7980-41A8-B151-9D25B292734F}" type="datetimeFigureOut">
               <a:rPr lang="en-US" smtClean="0"/>
-              <a:t>5/22/2019</a:t>
+              <a:t>5/23/2019</a:t>
             </a:fld>
             <a:endParaRPr lang="en-US"/>
           </a:p>
@@ -2612,7 +2613,7 @@
           <a:p>
             <a:fld id="{F4EAFB54-7980-41A8-B151-9D25B292734F}" type="datetimeFigureOut">
               <a:rPr lang="en-US" smtClean="0"/>
-              <a:t>5/22/2019</a:t>
+              <a:t>5/23/2019</a:t>
             </a:fld>
             <a:endParaRPr lang="en-US"/>
           </a:p>
@@ -3057,13 +3058,8 @@
           <a:p>
             <a:r>
               <a:rPr lang="en-US" dirty="0" smtClean="0"/>
-              <a:t>HILT </a:t>
-            </a:r>
-            <a:r>
-              <a:rPr lang="en-US" dirty="0" smtClean="0"/>
-              <a:t>2019</a:t>
-            </a:r>
-            <a:endParaRPr lang="en-US" dirty="0" smtClean="0"/>
+              <a:t>HILT 2019</a:t>
+            </a:r>
           </a:p>
           <a:p>
             <a:endParaRPr lang="en-US" dirty="0"/>
@@ -3091,6 +3087,116 @@
 </file>
 
 <file path=ppt/slides/slide10.xml><?xml version="1.0" encoding="utf-8"?>
+<p:sld xmlns:a="http://schemas.openxmlformats.org/drawingml/2006/main" xmlns:r="http://schemas.openxmlformats.org/officeDocument/2006/relationships" xmlns:p="http://schemas.openxmlformats.org/presentationml/2006/main">
+  <p:cSld>
+    <p:spTree>
+      <p:nvGrpSpPr>
+        <p:cNvPr id="1" name=""/>
+        <p:cNvGrpSpPr/>
+        <p:nvPr/>
+      </p:nvGrpSpPr>
+      <p:grpSpPr>
+        <a:xfrm>
+          <a:off x="0" y="0"/>
+          <a:ext cx="0" cy="0"/>
+          <a:chOff x="0" y="0"/>
+          <a:chExt cx="0" cy="0"/>
+        </a:xfrm>
+      </p:grpSpPr>
+      <p:pic>
+        <p:nvPicPr>
+          <p:cNvPr id="5" name="Picture 4"/>
+          <p:cNvPicPr>
+            <a:picLocks noChangeAspect="1"/>
+          </p:cNvPicPr>
+          <p:nvPr/>
+        </p:nvPicPr>
+        <p:blipFill>
+          <a:blip r:embed="rId2"/>
+          <a:stretch>
+            <a:fillRect/>
+          </a:stretch>
+        </p:blipFill>
+        <p:spPr>
+          <a:xfrm>
+            <a:off x="1860885" y="1277708"/>
+            <a:ext cx="8069178" cy="5218064"/>
+          </a:xfrm>
+          <a:prstGeom prst="rect">
+            <a:avLst/>
+          </a:prstGeom>
+        </p:spPr>
+      </p:pic>
+      <p:sp>
+        <p:nvSpPr>
+          <p:cNvPr id="6" name="Title 1"/>
+          <p:cNvSpPr txBox="1">
+            <a:spLocks/>
+          </p:cNvSpPr>
+          <p:nvPr/>
+        </p:nvSpPr>
+        <p:spPr>
+          <a:xfrm>
+            <a:off x="3176337" y="-481847"/>
+            <a:ext cx="9144000" cy="2387600"/>
+          </a:xfrm>
+          <a:prstGeom prst="rect">
+            <a:avLst/>
+          </a:prstGeom>
+        </p:spPr>
+        <p:txBody>
+          <a:bodyPr vert="horz" lIns="91440" tIns="45720" rIns="91440" bIns="45720" rtlCol="0" anchor="ctr">
+            <a:normAutofit/>
+          </a:bodyPr>
+          <a:lstStyle>
+            <a:lvl1pPr algn="l" defTabSz="914400" rtl="0" eaLnBrk="1" latinLnBrk="0" hangingPunct="1">
+              <a:lnSpc>
+                <a:spcPct val="90000"/>
+              </a:lnSpc>
+              <a:spcBef>
+                <a:spcPct val="0"/>
+              </a:spcBef>
+              <a:buNone/>
+              <a:defRPr sz="4400" kern="1200">
+                <a:solidFill>
+                  <a:schemeClr val="tx1"/>
+                </a:solidFill>
+                <a:latin typeface="+mj-lt"/>
+                <a:ea typeface="+mj-ea"/>
+                <a:cs typeface="+mj-cs"/>
+              </a:defRPr>
+            </a:lvl1pPr>
+          </a:lstStyle>
+          <a:p>
+            <a:r>
+              <a:rPr lang="en-US" dirty="0" smtClean="0"/>
+              <a:t>You are a programmer!</a:t>
+            </a:r>
+            <a:endParaRPr lang="en-US" dirty="0"/>
+          </a:p>
+        </p:txBody>
+      </p:sp>
+    </p:spTree>
+    <p:extLst>
+      <p:ext uri="{BB962C8B-B14F-4D97-AF65-F5344CB8AC3E}">
+        <p14:creationId xmlns:p14="http://schemas.microsoft.com/office/powerpoint/2010/main" val="4285280753"/>
+      </p:ext>
+    </p:extLst>
+  </p:cSld>
+  <p:clrMapOvr>
+    <a:masterClrMapping/>
+  </p:clrMapOvr>
+  <p:timing>
+    <p:tnLst>
+      <p:par>
+        <p:cTn id="1" dur="indefinite" restart="never" nodeType="tmRoot"/>
+      </p:par>
+    </p:tnLst>
+  </p:timing>
+</p:sld>
+</file>
+
+<file path=ppt/slides/slide11.xml><?xml version="1.0" encoding="utf-8"?>
 <p:sld xmlns:a="http://schemas.openxmlformats.org/drawingml/2006/main" xmlns:r="http://schemas.openxmlformats.org/officeDocument/2006/relationships" xmlns:p="http://schemas.openxmlformats.org/presentationml/2006/main">
   <p:cSld>
     <p:spTree>
@@ -3206,95 +3312,6 @@
 </p:sld>
 </file>
 
-<file path=ppt/slides/slide11.xml><?xml version="1.0" encoding="utf-8"?>
-<p:sld xmlns:a="http://schemas.openxmlformats.org/drawingml/2006/main" xmlns:r="http://schemas.openxmlformats.org/officeDocument/2006/relationships" xmlns:p="http://schemas.openxmlformats.org/presentationml/2006/main">
-  <p:cSld>
-    <p:spTree>
-      <p:nvGrpSpPr>
-        <p:cNvPr id="1" name=""/>
-        <p:cNvGrpSpPr/>
-        <p:nvPr/>
-      </p:nvGrpSpPr>
-      <p:grpSpPr>
-        <a:xfrm>
-          <a:off x="0" y="0"/>
-          <a:ext cx="0" cy="0"/>
-          <a:chOff x="0" y="0"/>
-          <a:chExt cx="0" cy="0"/>
-        </a:xfrm>
-      </p:grpSpPr>
-      <p:pic>
-        <p:nvPicPr>
-          <p:cNvPr id="4" name="Picture 3"/>
-          <p:cNvPicPr>
-            <a:picLocks noChangeAspect="1"/>
-          </p:cNvPicPr>
-          <p:nvPr/>
-        </p:nvPicPr>
-        <p:blipFill rotWithShape="1">
-          <a:blip r:embed="rId2">
-            <a:extLst>
-              <a:ext uri="{28A0092B-C50C-407E-A947-70E740481C1C}">
-                <a14:useLocalDpi xmlns:a14="http://schemas.microsoft.com/office/drawing/2010/main" val="0"/>
-              </a:ext>
-            </a:extLst>
-          </a:blip>
-          <a:srcRect t="-1" b="12944"/>
-          <a:stretch/>
-        </p:blipFill>
-        <p:spPr>
-          <a:xfrm>
-            <a:off x="2063431" y="1224950"/>
-            <a:ext cx="7724676" cy="5463901"/>
-          </a:xfrm>
-          <a:prstGeom prst="rect">
-            <a:avLst/>
-          </a:prstGeom>
-        </p:spPr>
-      </p:pic>
-      <p:sp>
-        <p:nvSpPr>
-          <p:cNvPr id="5" name="Title 1"/>
-          <p:cNvSpPr>
-            <a:spLocks noGrp="1"/>
-          </p:cNvSpPr>
-          <p:nvPr>
-            <p:ph type="title"/>
-          </p:nvPr>
-        </p:nvSpPr>
-        <p:spPr>
-          <a:xfrm>
-            <a:off x="855451" y="155519"/>
-            <a:ext cx="10703943" cy="1285093"/>
-          </a:xfrm>
-        </p:spPr>
-        <p:txBody>
-          <a:bodyPr>
-            <a:normAutofit/>
-          </a:bodyPr>
-          <a:lstStyle/>
-          <a:p>
-            <a:r>
-              <a:rPr lang="en-US" dirty="0" smtClean="0"/>
-              <a:t>So why would I use the CLI in a DH project?</a:t>
-            </a:r>
-            <a:endParaRPr lang="en-US" dirty="0"/>
-          </a:p>
-        </p:txBody>
-      </p:sp>
-    </p:spTree>
-    <p:extLst>
-      <p:ext uri="{BB962C8B-B14F-4D97-AF65-F5344CB8AC3E}">
-        <p14:creationId xmlns:p14="http://schemas.microsoft.com/office/powerpoint/2010/main" val="1376722408"/>
-      </p:ext>
-    </p:extLst>
-  </p:cSld>
-  <p:clrMapOvr>
-    <a:masterClrMapping/>
-  </p:clrMapOvr>
-</p:sld>
-</file>
-
 <file path=ppt/slides/slide12.xml><?xml version="1.0" encoding="utf-8"?>
 <p:sld xmlns:a="http://schemas.openxmlformats.org/drawingml/2006/main" xmlns:r="http://schemas.openxmlformats.org/officeDocument/2006/relationships" xmlns:p="http://schemas.openxmlformats.org/presentationml/2006/main">
   <p:cSld>
@@ -3536,13 +3553,8 @@
           <a:p>
             <a:r>
               <a:rPr lang="en-US" dirty="0" smtClean="0"/>
-              <a:t>HILT </a:t>
-            </a:r>
-            <a:r>
-              <a:rPr lang="en-US" dirty="0" smtClean="0"/>
-              <a:t>2019</a:t>
-            </a:r>
-            <a:endParaRPr lang="en-US" dirty="0" smtClean="0"/>
+              <a:t>HILT 2019</a:t>
+            </a:r>
           </a:p>
           <a:p>
             <a:endParaRPr lang="en-US" dirty="0"/>
@@ -3596,31 +3608,12 @@
             <p:ph type="title"/>
           </p:nvPr>
         </p:nvSpPr>
-        <p:spPr/>
-        <p:txBody>
-          <a:bodyPr/>
-          <a:lstStyle/>
-          <a:p>
-            <a:pPr algn="ctr"/>
-            <a:r>
-              <a:rPr lang="en-US" dirty="0" smtClean="0"/>
-              <a:t>Version Controlling</a:t>
-            </a:r>
-            <a:endParaRPr lang="en-US" dirty="0"/>
-          </a:p>
-        </p:txBody>
-      </p:sp>
-      <p:sp>
-        <p:nvSpPr>
-          <p:cNvPr id="3" name="Content Placeholder 2"/>
-          <p:cNvSpPr>
-            <a:spLocks noGrp="1"/>
-          </p:cNvSpPr>
-          <p:nvPr>
-            <p:ph idx="1"/>
-          </p:nvPr>
-        </p:nvSpPr>
-        <p:spPr/>
+        <p:spPr>
+          <a:xfrm>
+            <a:off x="838200" y="284915"/>
+            <a:ext cx="10515600" cy="6324433"/>
+          </a:xfrm>
+        </p:spPr>
         <p:txBody>
           <a:bodyPr>
             <a:normAutofit/>
@@ -3628,50 +3621,227 @@
           <a:lstStyle/>
           <a:p>
             <a:r>
-              <a:rPr lang="en-US" sz="3600" dirty="0" smtClean="0"/>
-              <a:t>Save TONS of different versions of project over time.</a:t>
-            </a:r>
-          </a:p>
-          <a:p>
-            <a:r>
-              <a:rPr lang="en-US" sz="3600" dirty="0" smtClean="0"/>
-              <a:t>Can recover ANY of those iterations.</a:t>
-            </a:r>
-          </a:p>
-          <a:p>
-            <a:r>
-              <a:rPr lang="en-US" sz="3600" dirty="0" smtClean="0"/>
-              <a:t>Nothing is ever lost.</a:t>
-            </a:r>
-          </a:p>
-          <a:p>
-            <a:r>
-              <a:rPr lang="en-US" sz="3600" dirty="0" smtClean="0"/>
-              <a:t>The date, time, and extent of every change is logged (so is the person who made the changes).</a:t>
-            </a:r>
-          </a:p>
-          <a:p>
-            <a:endParaRPr lang="en-US" sz="3600" dirty="0"/>
+              <a:rPr lang="en-US" dirty="0" smtClean="0"/>
+              <a:t>Right now we will cover:</a:t>
+            </a:r>
+            <a:br>
+              <a:rPr lang="en-US" dirty="0" smtClean="0"/>
+            </a:br>
+            <a:r>
+              <a:rPr lang="en-US" dirty="0"/>
+              <a:t/>
+            </a:r>
+            <a:br>
+              <a:rPr lang="en-US" dirty="0"/>
+            </a:br>
+            <a:r>
+              <a:rPr lang="en-US" dirty="0" smtClean="0"/>
+              <a:t/>
+            </a:r>
+            <a:br>
+              <a:rPr lang="en-US" dirty="0" smtClean="0"/>
+            </a:br>
+            <a:r>
+              <a:rPr lang="en-US" dirty="0"/>
+              <a:t/>
+            </a:r>
+            <a:br>
+              <a:rPr lang="en-US" dirty="0"/>
+            </a:br>
+            <a:r>
+              <a:rPr lang="en-US" dirty="0" smtClean="0"/>
+              <a:t/>
+            </a:r>
+            <a:br>
+              <a:rPr lang="en-US" dirty="0" smtClean="0"/>
+            </a:br>
+            <a:r>
+              <a:rPr lang="en-US" dirty="0" smtClean="0"/>
+              <a:t>… and will gesture toward:</a:t>
+            </a:r>
+            <a:r>
+              <a:rPr lang="en-US" dirty="0"/>
+              <a:t/>
+            </a:r>
+            <a:br>
+              <a:rPr lang="en-US" dirty="0"/>
+            </a:br>
+            <a:r>
+              <a:rPr lang="en-US" dirty="0" smtClean="0"/>
+              <a:t/>
+            </a:r>
+            <a:br>
+              <a:rPr lang="en-US" dirty="0" smtClean="0"/>
+            </a:br>
+            <a:r>
+              <a:rPr lang="en-US" dirty="0" smtClean="0"/>
+              <a:t/>
+            </a:r>
+            <a:br>
+              <a:rPr lang="en-US" dirty="0" smtClean="0"/>
+            </a:br>
+            <a:endParaRPr lang="en-US" dirty="0"/>
+          </a:p>
+        </p:txBody>
+      </p:sp>
+      <p:sp>
+        <p:nvSpPr>
+          <p:cNvPr id="3" name="Content Placeholder 2"/>
+          <p:cNvSpPr>
+            <a:spLocks noGrp="1"/>
+          </p:cNvSpPr>
+          <p:nvPr>
+            <p:ph idx="1"/>
+          </p:nvPr>
+        </p:nvSpPr>
+        <p:spPr>
+          <a:xfrm>
+            <a:off x="1407543" y="1790909"/>
+            <a:ext cx="10515600" cy="4351338"/>
+          </a:xfrm>
+        </p:spPr>
+        <p:txBody>
+          <a:bodyPr/>
+          <a:lstStyle/>
+          <a:p>
+            <a:pPr marL="514350" indent="-514350">
+              <a:buFont typeface="+mj-lt"/>
+              <a:buAutoNum type="arabicPeriod"/>
+            </a:pPr>
+            <a:r>
+              <a:rPr lang="en-US" dirty="0" smtClean="0"/>
+              <a:t>What is the </a:t>
+            </a:r>
+            <a:r>
+              <a:rPr lang="en-US" dirty="0" smtClean="0"/>
+              <a:t>“version controlling”?</a:t>
+            </a:r>
+          </a:p>
+          <a:p>
+            <a:pPr marL="514350" indent="-514350">
+              <a:buFont typeface="+mj-lt"/>
+              <a:buAutoNum type="arabicPeriod"/>
+            </a:pPr>
+            <a:r>
+              <a:rPr lang="en-US" dirty="0" smtClean="0"/>
+              <a:t>What is “</a:t>
+            </a:r>
+            <a:r>
+              <a:rPr lang="en-US" dirty="0" err="1" smtClean="0"/>
+              <a:t>git</a:t>
+            </a:r>
+            <a:r>
+              <a:rPr lang="en-US" dirty="0" smtClean="0"/>
+              <a:t>”?</a:t>
+            </a:r>
+            <a:endParaRPr lang="en-US" dirty="0" smtClean="0"/>
+          </a:p>
+          <a:p>
+            <a:pPr marL="514350" indent="-514350">
+              <a:buFont typeface="+mj-lt"/>
+              <a:buAutoNum type="arabicPeriod"/>
+            </a:pPr>
+            <a:r>
+              <a:rPr lang="en-US" dirty="0" smtClean="0"/>
+              <a:t>How </a:t>
+            </a:r>
+            <a:r>
+              <a:rPr lang="en-US" dirty="0" smtClean="0"/>
+              <a:t>do I use it?</a:t>
+            </a:r>
+            <a:endParaRPr lang="en-US" dirty="0" smtClean="0"/>
+          </a:p>
+          <a:p>
+            <a:pPr marL="514350" indent="-514350">
+              <a:buFont typeface="+mj-lt"/>
+              <a:buAutoNum type="arabicPeriod"/>
+            </a:pPr>
+            <a:endParaRPr lang="en-US" dirty="0"/>
+          </a:p>
+          <a:p>
+            <a:pPr marL="514350" indent="-514350">
+              <a:buFont typeface="+mj-lt"/>
+              <a:buAutoNum type="arabicPeriod"/>
+            </a:pPr>
+            <a:endParaRPr lang="en-US" dirty="0"/>
+          </a:p>
+          <a:p>
+            <a:pPr marL="514350" indent="-514350">
+              <a:buFont typeface="+mj-lt"/>
+              <a:buAutoNum type="arabicPeriod"/>
+            </a:pPr>
+            <a:endParaRPr lang="en-US" dirty="0" smtClean="0"/>
+          </a:p>
+          <a:p>
+            <a:pPr marL="514350" indent="-514350">
+              <a:buFont typeface="+mj-lt"/>
+              <a:buAutoNum type="arabicPeriod"/>
+            </a:pPr>
+            <a:r>
+              <a:rPr lang="en-US" dirty="0" smtClean="0"/>
+              <a:t>WHY would I use it?</a:t>
+            </a:r>
+          </a:p>
+          <a:p>
+            <a:endParaRPr lang="en-US" dirty="0"/>
+          </a:p>
+        </p:txBody>
+      </p:sp>
+      <p:sp>
+        <p:nvSpPr>
+          <p:cNvPr id="4" name="Title 1"/>
+          <p:cNvSpPr txBox="1">
+            <a:spLocks/>
+          </p:cNvSpPr>
+          <p:nvPr/>
+        </p:nvSpPr>
+        <p:spPr>
+          <a:xfrm>
+            <a:off x="320843" y="465346"/>
+            <a:ext cx="5658852" cy="1325563"/>
+          </a:xfrm>
+          <a:prstGeom prst="rect">
+            <a:avLst/>
+          </a:prstGeom>
+        </p:spPr>
+        <p:txBody>
+          <a:bodyPr vert="horz" lIns="91440" tIns="45720" rIns="91440" bIns="45720" rtlCol="0" anchor="ctr">
+            <a:normAutofit/>
+          </a:bodyPr>
+          <a:lstStyle>
+            <a:lvl1pPr algn="l" defTabSz="914400" rtl="0" eaLnBrk="1" latinLnBrk="0" hangingPunct="1">
+              <a:lnSpc>
+                <a:spcPct val="90000"/>
+              </a:lnSpc>
+              <a:spcBef>
+                <a:spcPct val="0"/>
+              </a:spcBef>
+              <a:buNone/>
+              <a:defRPr sz="4400" kern="1200">
+                <a:solidFill>
+                  <a:schemeClr val="tx1"/>
+                </a:solidFill>
+                <a:latin typeface="+mj-lt"/>
+                <a:ea typeface="+mj-ea"/>
+                <a:cs typeface="+mj-cs"/>
+              </a:defRPr>
+            </a:lvl1pPr>
+          </a:lstStyle>
+          <a:p>
+            <a:endParaRPr lang="en-US" sz="4000" dirty="0"/>
           </a:p>
         </p:txBody>
       </p:sp>
     </p:spTree>
     <p:extLst>
       <p:ext uri="{BB962C8B-B14F-4D97-AF65-F5344CB8AC3E}">
-        <p14:creationId xmlns:p14="http://schemas.microsoft.com/office/powerpoint/2010/main" val="2341958008"/>
+        <p14:creationId xmlns:p14="http://schemas.microsoft.com/office/powerpoint/2010/main" val="2905009276"/>
       </p:ext>
     </p:extLst>
   </p:cSld>
   <p:clrMapOvr>
     <a:masterClrMapping/>
   </p:clrMapOvr>
-  <p:timing>
-    <p:tnLst>
-      <p:par>
-        <p:cTn id="1" dur="indefinite" restart="never" nodeType="tmRoot"/>
-      </p:par>
-    </p:tnLst>
-  </p:timing>
 </p:sld>
 </file>
 
@@ -3692,68 +3862,79 @@
           <a:chExt cx="0" cy="0"/>
         </a:xfrm>
       </p:grpSpPr>
-      <p:pic>
-        <p:nvPicPr>
-          <p:cNvPr id="4" name="Content Placeholder 3"/>
-          <p:cNvPicPr>
-            <a:picLocks noGrp="1" noChangeAspect="1"/>
-          </p:cNvPicPr>
+      <p:sp>
+        <p:nvSpPr>
+          <p:cNvPr id="2" name="Title 1"/>
+          <p:cNvSpPr>
+            <a:spLocks noGrp="1"/>
+          </p:cNvSpPr>
+          <p:nvPr>
+            <p:ph type="title"/>
+          </p:nvPr>
+        </p:nvSpPr>
+        <p:spPr/>
+        <p:txBody>
+          <a:bodyPr/>
+          <a:lstStyle/>
+          <a:p>
+            <a:pPr algn="ctr"/>
+            <a:r>
+              <a:rPr lang="en-US" dirty="0" smtClean="0"/>
+              <a:t>Version Controlling</a:t>
+            </a:r>
+            <a:endParaRPr lang="en-US" dirty="0"/>
+          </a:p>
+        </p:txBody>
+      </p:sp>
+      <p:sp>
+        <p:nvSpPr>
+          <p:cNvPr id="3" name="Content Placeholder 2"/>
+          <p:cNvSpPr>
+            <a:spLocks noGrp="1"/>
+          </p:cNvSpPr>
           <p:nvPr>
             <p:ph idx="1"/>
           </p:nvPr>
-        </p:nvPicPr>
-        <p:blipFill rotWithShape="1">
-          <a:blip r:embed="rId2">
-            <a:extLst>
-              <a:ext uri="{28A0092B-C50C-407E-A947-70E740481C1C}">
-                <a14:useLocalDpi xmlns:a14="http://schemas.microsoft.com/office/drawing/2010/main" val="0"/>
-              </a:ext>
-            </a:extLst>
-          </a:blip>
-          <a:srcRect l="15581" t="12063" r="8680"/>
-          <a:stretch/>
-        </p:blipFill>
-        <p:spPr>
-          <a:xfrm>
-            <a:off x="3206906" y="172681"/>
-            <a:ext cx="7895755" cy="6574383"/>
-          </a:xfrm>
-        </p:spPr>
-      </p:pic>
-      <p:sp>
-        <p:nvSpPr>
-          <p:cNvPr id="2" name="TextBox 1"/>
-          <p:cNvSpPr txBox="1"/>
-          <p:nvPr/>
-        </p:nvSpPr>
-        <p:spPr>
-          <a:xfrm>
-            <a:off x="1505384" y="2422358"/>
-            <a:ext cx="827471" cy="1446550"/>
-          </a:xfrm>
-          <a:prstGeom prst="rect">
-            <a:avLst/>
-          </a:prstGeom>
-          <a:noFill/>
-        </p:spPr>
-        <p:txBody>
-          <a:bodyPr wrap="none" rtlCol="0">
-            <a:spAutoFit/>
+        </p:nvSpPr>
+        <p:spPr/>
+        <p:txBody>
+          <a:bodyPr>
+            <a:normAutofit/>
           </a:bodyPr>
           <a:lstStyle/>
           <a:p>
             <a:r>
-              <a:rPr lang="en-US" sz="8800" dirty="0" smtClean="0"/>
-              <a:t>:(</a:t>
-            </a:r>
-            <a:endParaRPr lang="en-US" sz="8800" dirty="0"/>
+              <a:rPr lang="en-US" sz="3600" dirty="0" smtClean="0"/>
+              <a:t>Save TONS of different versions of project over time.</a:t>
+            </a:r>
+          </a:p>
+          <a:p>
+            <a:r>
+              <a:rPr lang="en-US" sz="3600" dirty="0" smtClean="0"/>
+              <a:t>Can recover ANY of those iterations.</a:t>
+            </a:r>
+          </a:p>
+          <a:p>
+            <a:r>
+              <a:rPr lang="en-US" sz="3600" dirty="0" smtClean="0"/>
+              <a:t>Nothing is ever lost.</a:t>
+            </a:r>
+          </a:p>
+          <a:p>
+            <a:r>
+              <a:rPr lang="en-US" sz="3600" dirty="0" smtClean="0"/>
+              <a:t>The date, time, and extent of every change is logged (so is the person who made the changes).</a:t>
+            </a:r>
+          </a:p>
+          <a:p>
+            <a:endParaRPr lang="en-US" sz="3600" dirty="0"/>
           </a:p>
         </p:txBody>
       </p:sp>
     </p:spTree>
     <p:extLst>
       <p:ext uri="{BB962C8B-B14F-4D97-AF65-F5344CB8AC3E}">
-        <p14:creationId xmlns:p14="http://schemas.microsoft.com/office/powerpoint/2010/main" val="1490363422"/>
+        <p14:creationId xmlns:p14="http://schemas.microsoft.com/office/powerpoint/2010/main" val="2341958008"/>
       </p:ext>
     </p:extLst>
   </p:cSld>
@@ -3787,15 +3968,43 @@
           <a:chExt cx="0" cy="0"/>
         </a:xfrm>
       </p:grpSpPr>
+      <p:sp>
+        <p:nvSpPr>
+          <p:cNvPr id="2" name="TextBox 1"/>
+          <p:cNvSpPr txBox="1"/>
+          <p:nvPr/>
+        </p:nvSpPr>
+        <p:spPr>
+          <a:xfrm>
+            <a:off x="1505384" y="2422358"/>
+            <a:ext cx="827471" cy="1446550"/>
+          </a:xfrm>
+          <a:prstGeom prst="rect">
+            <a:avLst/>
+          </a:prstGeom>
+          <a:noFill/>
+        </p:spPr>
+        <p:txBody>
+          <a:bodyPr wrap="none" rtlCol="0">
+            <a:spAutoFit/>
+          </a:bodyPr>
+          <a:lstStyle/>
+          <a:p>
+            <a:r>
+              <a:rPr lang="en-US" sz="8800" dirty="0" smtClean="0"/>
+              <a:t>:(</a:t>
+            </a:r>
+            <a:endParaRPr lang="en-US" sz="8800" dirty="0"/>
+          </a:p>
+        </p:txBody>
+      </p:sp>
       <p:pic>
         <p:nvPicPr>
-          <p:cNvPr id="4" name="Content Placeholder 3"/>
+          <p:cNvPr id="6" name="Picture 5"/>
           <p:cNvPicPr>
-            <a:picLocks noGrp="1" noChangeAspect="1"/>
+            <a:picLocks noChangeAspect="1"/>
           </p:cNvPicPr>
-          <p:nvPr>
-            <p:ph idx="1"/>
-          </p:nvPr>
+          <p:nvPr/>
         </p:nvPicPr>
         <p:blipFill>
           <a:blip r:embed="rId2">
@@ -3811,45 +4020,18 @@
         </p:blipFill>
         <p:spPr>
           <a:xfrm>
-            <a:off x="3704883" y="105182"/>
-            <a:ext cx="6358600" cy="6571663"/>
-          </a:xfrm>
-        </p:spPr>
-      </p:pic>
-      <p:sp>
-        <p:nvSpPr>
-          <p:cNvPr id="3" name="TextBox 2"/>
-          <p:cNvSpPr txBox="1"/>
-          <p:nvPr/>
-        </p:nvSpPr>
-        <p:spPr>
-          <a:xfrm>
-            <a:off x="1505384" y="2422358"/>
-            <a:ext cx="827471" cy="1446550"/>
+            <a:off x="3698583" y="103213"/>
+            <a:ext cx="7064065" cy="6612547"/>
           </a:xfrm>
           <a:prstGeom prst="rect">
             <a:avLst/>
           </a:prstGeom>
-          <a:noFill/>
         </p:spPr>
-        <p:txBody>
-          <a:bodyPr wrap="none" rtlCol="0">
-            <a:spAutoFit/>
-          </a:bodyPr>
-          <a:lstStyle/>
-          <a:p>
-            <a:r>
-              <a:rPr lang="en-US" sz="8800" dirty="0" smtClean="0"/>
-              <a:t>:)</a:t>
-            </a:r>
-            <a:endParaRPr lang="en-US" sz="8800" dirty="0"/>
-          </a:p>
-        </p:txBody>
-      </p:sp>
+      </p:pic>
     </p:spTree>
     <p:extLst>
       <p:ext uri="{BB962C8B-B14F-4D97-AF65-F5344CB8AC3E}">
-        <p14:creationId xmlns:p14="http://schemas.microsoft.com/office/powerpoint/2010/main" val="1151761814"/>
+        <p14:creationId xmlns:p14="http://schemas.microsoft.com/office/powerpoint/2010/main" val="1490363422"/>
       </p:ext>
     </p:extLst>
   </p:cSld>
@@ -3883,79 +4065,69 @@
           <a:chExt cx="0" cy="0"/>
         </a:xfrm>
       </p:grpSpPr>
-      <p:sp>
-        <p:nvSpPr>
-          <p:cNvPr id="2" name="Title 1"/>
-          <p:cNvSpPr>
-            <a:spLocks noGrp="1"/>
-          </p:cNvSpPr>
-          <p:nvPr>
-            <p:ph type="title"/>
-          </p:nvPr>
-        </p:nvSpPr>
-        <p:spPr/>
-        <p:txBody>
-          <a:bodyPr/>
-          <a:lstStyle/>
-          <a:p>
-            <a:pPr algn="ctr"/>
-            <a:r>
-              <a:rPr lang="en-US" dirty="0" err="1" smtClean="0"/>
-              <a:t>Git</a:t>
-            </a:r>
-            <a:endParaRPr lang="en-US" dirty="0"/>
-          </a:p>
-        </p:txBody>
-      </p:sp>
-      <p:sp>
-        <p:nvSpPr>
-          <p:cNvPr id="3" name="Content Placeholder 2"/>
-          <p:cNvSpPr>
-            <a:spLocks noGrp="1"/>
-          </p:cNvSpPr>
+      <p:pic>
+        <p:nvPicPr>
+          <p:cNvPr id="4" name="Content Placeholder 3"/>
+          <p:cNvPicPr>
+            <a:picLocks noGrp="1" noChangeAspect="1"/>
+          </p:cNvPicPr>
           <p:nvPr>
             <p:ph idx="1"/>
           </p:nvPr>
-        </p:nvSpPr>
-        <p:spPr/>
-        <p:txBody>
-          <a:bodyPr>
-            <a:normAutofit/>
+        </p:nvPicPr>
+        <p:blipFill>
+          <a:blip r:embed="rId2">
+            <a:extLst>
+              <a:ext uri="{28A0092B-C50C-407E-A947-70E740481C1C}">
+                <a14:useLocalDpi xmlns:a14="http://schemas.microsoft.com/office/drawing/2010/main" val="0"/>
+              </a:ext>
+            </a:extLst>
+          </a:blip>
+          <a:stretch>
+            <a:fillRect/>
+          </a:stretch>
+        </p:blipFill>
+        <p:spPr>
+          <a:xfrm>
+            <a:off x="3704883" y="105182"/>
+            <a:ext cx="6358600" cy="6571663"/>
+          </a:xfrm>
+        </p:spPr>
+      </p:pic>
+      <p:sp>
+        <p:nvSpPr>
+          <p:cNvPr id="3" name="TextBox 2"/>
+          <p:cNvSpPr txBox="1"/>
+          <p:nvPr/>
+        </p:nvSpPr>
+        <p:spPr>
+          <a:xfrm>
+            <a:off x="1505384" y="2422358"/>
+            <a:ext cx="827471" cy="1446550"/>
+          </a:xfrm>
+          <a:prstGeom prst="rect">
+            <a:avLst/>
+          </a:prstGeom>
+          <a:noFill/>
+        </p:spPr>
+        <p:txBody>
+          <a:bodyPr wrap="none" rtlCol="0">
+            <a:spAutoFit/>
           </a:bodyPr>
           <a:lstStyle/>
           <a:p>
             <a:r>
-              <a:rPr lang="en-US" sz="3600" dirty="0" smtClean="0"/>
-              <a:t>Distributed Version Control System.</a:t>
-            </a:r>
-          </a:p>
-          <a:p>
-            <a:r>
-              <a:rPr lang="en-US" sz="3600" dirty="0" smtClean="0"/>
-              <a:t>Each clone gets the entire project history.</a:t>
-            </a:r>
-          </a:p>
-          <a:p>
-            <a:r>
-              <a:rPr lang="en-US" sz="3600" dirty="0" smtClean="0"/>
-              <a:t>Code exists, in full, everywhere.</a:t>
-            </a:r>
-          </a:p>
-          <a:p>
-            <a:r>
-              <a:rPr lang="en-US" sz="3600" dirty="0" smtClean="0"/>
-              <a:t>Allows easy collaboration via GitHub.</a:t>
-            </a:r>
-          </a:p>
-          <a:p>
-            <a:endParaRPr lang="en-US" sz="3600" dirty="0"/>
+              <a:rPr lang="en-US" sz="8800" dirty="0" smtClean="0"/>
+              <a:t>:)</a:t>
+            </a:r>
+            <a:endParaRPr lang="en-US" sz="8800" dirty="0"/>
           </a:p>
         </p:txBody>
       </p:sp>
     </p:spTree>
     <p:extLst>
       <p:ext uri="{BB962C8B-B14F-4D97-AF65-F5344CB8AC3E}">
-        <p14:creationId xmlns:p14="http://schemas.microsoft.com/office/powerpoint/2010/main" val="2311746495"/>
+        <p14:creationId xmlns:p14="http://schemas.microsoft.com/office/powerpoint/2010/main" val="1151761814"/>
       </p:ext>
     </p:extLst>
   </p:cSld>
@@ -4006,6 +4178,112 @@
           <a:p>
             <a:pPr algn="ctr"/>
             <a:r>
+              <a:rPr lang="en-US" dirty="0" err="1" smtClean="0"/>
+              <a:t>Git</a:t>
+            </a:r>
+            <a:endParaRPr lang="en-US" dirty="0"/>
+          </a:p>
+        </p:txBody>
+      </p:sp>
+      <p:sp>
+        <p:nvSpPr>
+          <p:cNvPr id="3" name="Content Placeholder 2"/>
+          <p:cNvSpPr>
+            <a:spLocks noGrp="1"/>
+          </p:cNvSpPr>
+          <p:nvPr>
+            <p:ph idx="1"/>
+          </p:nvPr>
+        </p:nvSpPr>
+        <p:spPr/>
+        <p:txBody>
+          <a:bodyPr>
+            <a:normAutofit/>
+          </a:bodyPr>
+          <a:lstStyle/>
+          <a:p>
+            <a:r>
+              <a:rPr lang="en-US" sz="3600" dirty="0" smtClean="0"/>
+              <a:t>Distributed Version Control System.</a:t>
+            </a:r>
+          </a:p>
+          <a:p>
+            <a:r>
+              <a:rPr lang="en-US" sz="3600" dirty="0" smtClean="0"/>
+              <a:t>Each clone gets the entire project history.</a:t>
+            </a:r>
+          </a:p>
+          <a:p>
+            <a:r>
+              <a:rPr lang="en-US" sz="3600" dirty="0" smtClean="0"/>
+              <a:t>Code exists, in full, everywhere.</a:t>
+            </a:r>
+          </a:p>
+          <a:p>
+            <a:r>
+              <a:rPr lang="en-US" sz="3600" dirty="0" smtClean="0"/>
+              <a:t>Allows easy collaboration via GitHub.</a:t>
+            </a:r>
+          </a:p>
+          <a:p>
+            <a:endParaRPr lang="en-US" sz="3600" dirty="0"/>
+          </a:p>
+        </p:txBody>
+      </p:sp>
+    </p:spTree>
+    <p:extLst>
+      <p:ext uri="{BB962C8B-B14F-4D97-AF65-F5344CB8AC3E}">
+        <p14:creationId xmlns:p14="http://schemas.microsoft.com/office/powerpoint/2010/main" val="2311746495"/>
+      </p:ext>
+    </p:extLst>
+  </p:cSld>
+  <p:clrMapOvr>
+    <a:masterClrMapping/>
+  </p:clrMapOvr>
+  <p:timing>
+    <p:tnLst>
+      <p:par>
+        <p:cTn id="1" dur="indefinite" restart="never" nodeType="tmRoot"/>
+      </p:par>
+    </p:tnLst>
+  </p:timing>
+</p:sld>
+</file>
+
+<file path=ppt/slides/slide19.xml><?xml version="1.0" encoding="utf-8"?>
+<p:sld xmlns:a="http://schemas.openxmlformats.org/drawingml/2006/main" xmlns:r="http://schemas.openxmlformats.org/officeDocument/2006/relationships" xmlns:p="http://schemas.openxmlformats.org/presentationml/2006/main">
+  <p:cSld>
+    <p:spTree>
+      <p:nvGrpSpPr>
+        <p:cNvPr id="1" name=""/>
+        <p:cNvGrpSpPr/>
+        <p:nvPr/>
+      </p:nvGrpSpPr>
+      <p:grpSpPr>
+        <a:xfrm>
+          <a:off x="0" y="0"/>
+          <a:ext cx="0" cy="0"/>
+          <a:chOff x="0" y="0"/>
+          <a:chExt cx="0" cy="0"/>
+        </a:xfrm>
+      </p:grpSpPr>
+      <p:sp>
+        <p:nvSpPr>
+          <p:cNvPr id="2" name="Title 1"/>
+          <p:cNvSpPr>
+            <a:spLocks noGrp="1"/>
+          </p:cNvSpPr>
+          <p:nvPr>
+            <p:ph type="title"/>
+          </p:nvPr>
+        </p:nvSpPr>
+        <p:spPr/>
+        <p:txBody>
+          <a:bodyPr/>
+          <a:lstStyle/>
+          <a:p>
+            <a:pPr algn="ctr"/>
+            <a:r>
               <a:rPr lang="en-US" dirty="0" smtClean="0"/>
               <a:t>Workflow with Commands</a:t>
             </a:r>
@@ -4150,7 +4428,250 @@
 </p:sld>
 </file>
 
-<file path=ppt/slides/slide19.xml><?xml version="1.0" encoding="utf-8"?>
+<file path=ppt/slides/slide2.xml><?xml version="1.0" encoding="utf-8"?>
+<p:sld xmlns:a="http://schemas.openxmlformats.org/drawingml/2006/main" xmlns:r="http://schemas.openxmlformats.org/officeDocument/2006/relationships" xmlns:p="http://schemas.openxmlformats.org/presentationml/2006/main">
+  <p:cSld>
+    <p:spTree>
+      <p:nvGrpSpPr>
+        <p:cNvPr id="1" name=""/>
+        <p:cNvGrpSpPr/>
+        <p:nvPr/>
+      </p:nvGrpSpPr>
+      <p:grpSpPr>
+        <a:xfrm>
+          <a:off x="0" y="0"/>
+          <a:ext cx="0" cy="0"/>
+          <a:chOff x="0" y="0"/>
+          <a:chExt cx="0" cy="0"/>
+        </a:xfrm>
+      </p:grpSpPr>
+      <p:sp>
+        <p:nvSpPr>
+          <p:cNvPr id="2" name="Title 1"/>
+          <p:cNvSpPr>
+            <a:spLocks noGrp="1"/>
+          </p:cNvSpPr>
+          <p:nvPr>
+            <p:ph type="title"/>
+          </p:nvPr>
+        </p:nvSpPr>
+        <p:spPr>
+          <a:xfrm>
+            <a:off x="838200" y="284915"/>
+            <a:ext cx="10515600" cy="6324433"/>
+          </a:xfrm>
+        </p:spPr>
+        <p:txBody>
+          <a:bodyPr>
+            <a:normAutofit/>
+          </a:bodyPr>
+          <a:lstStyle/>
+          <a:p>
+            <a:r>
+              <a:rPr lang="en-US" dirty="0" smtClean="0"/>
+              <a:t>Right now we will cover:</a:t>
+            </a:r>
+            <a:br>
+              <a:rPr lang="en-US" dirty="0" smtClean="0"/>
+            </a:br>
+            <a:r>
+              <a:rPr lang="en-US" dirty="0"/>
+              <a:t/>
+            </a:r>
+            <a:br>
+              <a:rPr lang="en-US" dirty="0"/>
+            </a:br>
+            <a:r>
+              <a:rPr lang="en-US" dirty="0" smtClean="0"/>
+              <a:t/>
+            </a:r>
+            <a:br>
+              <a:rPr lang="en-US" dirty="0" smtClean="0"/>
+            </a:br>
+            <a:r>
+              <a:rPr lang="en-US" dirty="0"/>
+              <a:t/>
+            </a:r>
+            <a:br>
+              <a:rPr lang="en-US" dirty="0"/>
+            </a:br>
+            <a:r>
+              <a:rPr lang="en-US" dirty="0" smtClean="0"/>
+              <a:t/>
+            </a:r>
+            <a:br>
+              <a:rPr lang="en-US" dirty="0" smtClean="0"/>
+            </a:br>
+            <a:r>
+              <a:rPr lang="en-US" dirty="0" smtClean="0"/>
+              <a:t>… and will gesture toward:</a:t>
+            </a:r>
+            <a:r>
+              <a:rPr lang="en-US" dirty="0"/>
+              <a:t/>
+            </a:r>
+            <a:br>
+              <a:rPr lang="en-US" dirty="0"/>
+            </a:br>
+            <a:r>
+              <a:rPr lang="en-US" dirty="0" smtClean="0"/>
+              <a:t/>
+            </a:r>
+            <a:br>
+              <a:rPr lang="en-US" dirty="0" smtClean="0"/>
+            </a:br>
+            <a:r>
+              <a:rPr lang="en-US" dirty="0" smtClean="0"/>
+              <a:t/>
+            </a:r>
+            <a:br>
+              <a:rPr lang="en-US" dirty="0" smtClean="0"/>
+            </a:br>
+            <a:endParaRPr lang="en-US" dirty="0"/>
+          </a:p>
+        </p:txBody>
+      </p:sp>
+      <p:sp>
+        <p:nvSpPr>
+          <p:cNvPr id="3" name="Content Placeholder 2"/>
+          <p:cNvSpPr>
+            <a:spLocks noGrp="1"/>
+          </p:cNvSpPr>
+          <p:nvPr>
+            <p:ph idx="1"/>
+          </p:nvPr>
+        </p:nvSpPr>
+        <p:spPr>
+          <a:xfrm>
+            <a:off x="1407543" y="1790909"/>
+            <a:ext cx="10515600" cy="4351338"/>
+          </a:xfrm>
+        </p:spPr>
+        <p:txBody>
+          <a:bodyPr/>
+          <a:lstStyle/>
+          <a:p>
+            <a:pPr marL="514350" indent="-514350">
+              <a:buFont typeface="+mj-lt"/>
+              <a:buAutoNum type="arabicPeriod"/>
+            </a:pPr>
+            <a:r>
+              <a:rPr lang="en-US" dirty="0" smtClean="0"/>
+              <a:t>What is the “command line interface”?</a:t>
+            </a:r>
+          </a:p>
+          <a:p>
+            <a:pPr marL="514350" indent="-514350">
+              <a:buFont typeface="+mj-lt"/>
+              <a:buAutoNum type="arabicPeriod"/>
+            </a:pPr>
+            <a:r>
+              <a:rPr lang="en-US" dirty="0" smtClean="0"/>
+              <a:t>How do I use it?</a:t>
+            </a:r>
+          </a:p>
+          <a:p>
+            <a:pPr marL="514350" indent="-514350">
+              <a:buFont typeface="+mj-lt"/>
+              <a:buAutoNum type="arabicPeriod"/>
+            </a:pPr>
+            <a:endParaRPr lang="en-US" dirty="0"/>
+          </a:p>
+          <a:p>
+            <a:pPr marL="514350" indent="-514350">
+              <a:buFont typeface="+mj-lt"/>
+              <a:buAutoNum type="arabicPeriod"/>
+            </a:pPr>
+            <a:endParaRPr lang="en-US" dirty="0" smtClean="0"/>
+          </a:p>
+          <a:p>
+            <a:pPr marL="514350" indent="-514350">
+              <a:buFont typeface="+mj-lt"/>
+              <a:buAutoNum type="arabicPeriod"/>
+            </a:pPr>
+            <a:endParaRPr lang="en-US" dirty="0"/>
+          </a:p>
+          <a:p>
+            <a:pPr marL="514350" indent="-514350">
+              <a:buFont typeface="+mj-lt"/>
+              <a:buAutoNum type="arabicPeriod"/>
+            </a:pPr>
+            <a:endParaRPr lang="en-US" dirty="0" smtClean="0"/>
+          </a:p>
+          <a:p>
+            <a:pPr marL="514350" indent="-514350">
+              <a:buFont typeface="+mj-lt"/>
+              <a:buAutoNum type="arabicPeriod"/>
+            </a:pPr>
+            <a:r>
+              <a:rPr lang="en-US" dirty="0" smtClean="0"/>
+              <a:t>WHY would I use it?</a:t>
+            </a:r>
+          </a:p>
+          <a:p>
+            <a:endParaRPr lang="en-US" dirty="0"/>
+          </a:p>
+        </p:txBody>
+      </p:sp>
+      <p:sp>
+        <p:nvSpPr>
+          <p:cNvPr id="4" name="Title 1"/>
+          <p:cNvSpPr txBox="1">
+            <a:spLocks/>
+          </p:cNvSpPr>
+          <p:nvPr/>
+        </p:nvSpPr>
+        <p:spPr>
+          <a:xfrm>
+            <a:off x="320843" y="465346"/>
+            <a:ext cx="5658852" cy="1325563"/>
+          </a:xfrm>
+          <a:prstGeom prst="rect">
+            <a:avLst/>
+          </a:prstGeom>
+        </p:spPr>
+        <p:txBody>
+          <a:bodyPr vert="horz" lIns="91440" tIns="45720" rIns="91440" bIns="45720" rtlCol="0" anchor="ctr">
+            <a:normAutofit/>
+          </a:bodyPr>
+          <a:lstStyle>
+            <a:lvl1pPr algn="l" defTabSz="914400" rtl="0" eaLnBrk="1" latinLnBrk="0" hangingPunct="1">
+              <a:lnSpc>
+                <a:spcPct val="90000"/>
+              </a:lnSpc>
+              <a:spcBef>
+                <a:spcPct val="0"/>
+              </a:spcBef>
+              <a:buNone/>
+              <a:defRPr sz="4400" kern="1200">
+                <a:solidFill>
+                  <a:schemeClr val="tx1"/>
+                </a:solidFill>
+                <a:latin typeface="+mj-lt"/>
+                <a:ea typeface="+mj-ea"/>
+                <a:cs typeface="+mj-cs"/>
+              </a:defRPr>
+            </a:lvl1pPr>
+          </a:lstStyle>
+          <a:p>
+            <a:endParaRPr lang="en-US" sz="4000" dirty="0"/>
+          </a:p>
+        </p:txBody>
+      </p:sp>
+    </p:spTree>
+    <p:extLst>
+      <p:ext uri="{BB962C8B-B14F-4D97-AF65-F5344CB8AC3E}">
+        <p14:creationId xmlns:p14="http://schemas.microsoft.com/office/powerpoint/2010/main" val="819911350"/>
+      </p:ext>
+    </p:extLst>
+  </p:cSld>
+  <p:clrMapOvr>
+    <a:masterClrMapping/>
+  </p:clrMapOvr>
+</p:sld>
+</file>
+
+<file path=ppt/slides/slide20.xml><?xml version="1.0" encoding="utf-8"?>
 <p:sld xmlns:a="http://schemas.openxmlformats.org/drawingml/2006/main" xmlns:r="http://schemas.openxmlformats.org/officeDocument/2006/relationships" xmlns:p="http://schemas.openxmlformats.org/presentationml/2006/main">
   <p:cSld>
     <p:spTree>
@@ -4578,250 +5099,7 @@
 </p:sld>
 </file>
 
-<file path=ppt/slides/slide2.xml><?xml version="1.0" encoding="utf-8"?>
-<p:sld xmlns:a="http://schemas.openxmlformats.org/drawingml/2006/main" xmlns:r="http://schemas.openxmlformats.org/officeDocument/2006/relationships" xmlns:p="http://schemas.openxmlformats.org/presentationml/2006/main">
-  <p:cSld>
-    <p:spTree>
-      <p:nvGrpSpPr>
-        <p:cNvPr id="1" name=""/>
-        <p:cNvGrpSpPr/>
-        <p:nvPr/>
-      </p:nvGrpSpPr>
-      <p:grpSpPr>
-        <a:xfrm>
-          <a:off x="0" y="0"/>
-          <a:ext cx="0" cy="0"/>
-          <a:chOff x="0" y="0"/>
-          <a:chExt cx="0" cy="0"/>
-        </a:xfrm>
-      </p:grpSpPr>
-      <p:sp>
-        <p:nvSpPr>
-          <p:cNvPr id="2" name="Title 1"/>
-          <p:cNvSpPr>
-            <a:spLocks noGrp="1"/>
-          </p:cNvSpPr>
-          <p:nvPr>
-            <p:ph type="title"/>
-          </p:nvPr>
-        </p:nvSpPr>
-        <p:spPr>
-          <a:xfrm>
-            <a:off x="838200" y="284915"/>
-            <a:ext cx="10515600" cy="6324433"/>
-          </a:xfrm>
-        </p:spPr>
-        <p:txBody>
-          <a:bodyPr>
-            <a:normAutofit/>
-          </a:bodyPr>
-          <a:lstStyle/>
-          <a:p>
-            <a:r>
-              <a:rPr lang="en-US" dirty="0" smtClean="0"/>
-              <a:t>Right now we will cover:</a:t>
-            </a:r>
-            <a:br>
-              <a:rPr lang="en-US" dirty="0" smtClean="0"/>
-            </a:br>
-            <a:r>
-              <a:rPr lang="en-US" dirty="0"/>
-              <a:t/>
-            </a:r>
-            <a:br>
-              <a:rPr lang="en-US" dirty="0"/>
-            </a:br>
-            <a:r>
-              <a:rPr lang="en-US" dirty="0" smtClean="0"/>
-              <a:t/>
-            </a:r>
-            <a:br>
-              <a:rPr lang="en-US" dirty="0" smtClean="0"/>
-            </a:br>
-            <a:r>
-              <a:rPr lang="en-US" dirty="0"/>
-              <a:t/>
-            </a:r>
-            <a:br>
-              <a:rPr lang="en-US" dirty="0"/>
-            </a:br>
-            <a:r>
-              <a:rPr lang="en-US" dirty="0" smtClean="0"/>
-              <a:t/>
-            </a:r>
-            <a:br>
-              <a:rPr lang="en-US" dirty="0" smtClean="0"/>
-            </a:br>
-            <a:r>
-              <a:rPr lang="en-US" dirty="0" smtClean="0"/>
-              <a:t>… and will gesture toward:</a:t>
-            </a:r>
-            <a:r>
-              <a:rPr lang="en-US" dirty="0"/>
-              <a:t/>
-            </a:r>
-            <a:br>
-              <a:rPr lang="en-US" dirty="0"/>
-            </a:br>
-            <a:r>
-              <a:rPr lang="en-US" dirty="0" smtClean="0"/>
-              <a:t/>
-            </a:r>
-            <a:br>
-              <a:rPr lang="en-US" dirty="0" smtClean="0"/>
-            </a:br>
-            <a:r>
-              <a:rPr lang="en-US" dirty="0" smtClean="0"/>
-              <a:t/>
-            </a:r>
-            <a:br>
-              <a:rPr lang="en-US" dirty="0" smtClean="0"/>
-            </a:br>
-            <a:endParaRPr lang="en-US" dirty="0"/>
-          </a:p>
-        </p:txBody>
-      </p:sp>
-      <p:sp>
-        <p:nvSpPr>
-          <p:cNvPr id="3" name="Content Placeholder 2"/>
-          <p:cNvSpPr>
-            <a:spLocks noGrp="1"/>
-          </p:cNvSpPr>
-          <p:nvPr>
-            <p:ph idx="1"/>
-          </p:nvPr>
-        </p:nvSpPr>
-        <p:spPr>
-          <a:xfrm>
-            <a:off x="1407543" y="1790909"/>
-            <a:ext cx="10515600" cy="4351338"/>
-          </a:xfrm>
-        </p:spPr>
-        <p:txBody>
-          <a:bodyPr/>
-          <a:lstStyle/>
-          <a:p>
-            <a:pPr marL="514350" indent="-514350">
-              <a:buFont typeface="+mj-lt"/>
-              <a:buAutoNum type="arabicPeriod"/>
-            </a:pPr>
-            <a:r>
-              <a:rPr lang="en-US" dirty="0" smtClean="0"/>
-              <a:t>What is the “command line interface”?</a:t>
-            </a:r>
-          </a:p>
-          <a:p>
-            <a:pPr marL="514350" indent="-514350">
-              <a:buFont typeface="+mj-lt"/>
-              <a:buAutoNum type="arabicPeriod"/>
-            </a:pPr>
-            <a:r>
-              <a:rPr lang="en-US" dirty="0" smtClean="0"/>
-              <a:t>How do I use it?</a:t>
-            </a:r>
-          </a:p>
-          <a:p>
-            <a:pPr marL="514350" indent="-514350">
-              <a:buFont typeface="+mj-lt"/>
-              <a:buAutoNum type="arabicPeriod"/>
-            </a:pPr>
-            <a:endParaRPr lang="en-US" dirty="0"/>
-          </a:p>
-          <a:p>
-            <a:pPr marL="514350" indent="-514350">
-              <a:buFont typeface="+mj-lt"/>
-              <a:buAutoNum type="arabicPeriod"/>
-            </a:pPr>
-            <a:endParaRPr lang="en-US" dirty="0" smtClean="0"/>
-          </a:p>
-          <a:p>
-            <a:pPr marL="514350" indent="-514350">
-              <a:buFont typeface="+mj-lt"/>
-              <a:buAutoNum type="arabicPeriod"/>
-            </a:pPr>
-            <a:endParaRPr lang="en-US" dirty="0"/>
-          </a:p>
-          <a:p>
-            <a:pPr marL="514350" indent="-514350">
-              <a:buFont typeface="+mj-lt"/>
-              <a:buAutoNum type="arabicPeriod"/>
-            </a:pPr>
-            <a:endParaRPr lang="en-US" dirty="0" smtClean="0"/>
-          </a:p>
-          <a:p>
-            <a:pPr marL="514350" indent="-514350">
-              <a:buFont typeface="+mj-lt"/>
-              <a:buAutoNum type="arabicPeriod"/>
-            </a:pPr>
-            <a:r>
-              <a:rPr lang="en-US" dirty="0" smtClean="0"/>
-              <a:t>WHY would I use it?</a:t>
-            </a:r>
-          </a:p>
-          <a:p>
-            <a:endParaRPr lang="en-US" dirty="0"/>
-          </a:p>
-        </p:txBody>
-      </p:sp>
-      <p:sp>
-        <p:nvSpPr>
-          <p:cNvPr id="4" name="Title 1"/>
-          <p:cNvSpPr txBox="1">
-            <a:spLocks/>
-          </p:cNvSpPr>
-          <p:nvPr/>
-        </p:nvSpPr>
-        <p:spPr>
-          <a:xfrm>
-            <a:off x="320843" y="465346"/>
-            <a:ext cx="5658852" cy="1325563"/>
-          </a:xfrm>
-          <a:prstGeom prst="rect">
-            <a:avLst/>
-          </a:prstGeom>
-        </p:spPr>
-        <p:txBody>
-          <a:bodyPr vert="horz" lIns="91440" tIns="45720" rIns="91440" bIns="45720" rtlCol="0" anchor="ctr">
-            <a:normAutofit/>
-          </a:bodyPr>
-          <a:lstStyle>
-            <a:lvl1pPr algn="l" defTabSz="914400" rtl="0" eaLnBrk="1" latinLnBrk="0" hangingPunct="1">
-              <a:lnSpc>
-                <a:spcPct val="90000"/>
-              </a:lnSpc>
-              <a:spcBef>
-                <a:spcPct val="0"/>
-              </a:spcBef>
-              <a:buNone/>
-              <a:defRPr sz="4400" kern="1200">
-                <a:solidFill>
-                  <a:schemeClr val="tx1"/>
-                </a:solidFill>
-                <a:latin typeface="+mj-lt"/>
-                <a:ea typeface="+mj-ea"/>
-                <a:cs typeface="+mj-cs"/>
-              </a:defRPr>
-            </a:lvl1pPr>
-          </a:lstStyle>
-          <a:p>
-            <a:endParaRPr lang="en-US" sz="4000" dirty="0"/>
-          </a:p>
-        </p:txBody>
-      </p:sp>
-    </p:spTree>
-    <p:extLst>
-      <p:ext uri="{BB962C8B-B14F-4D97-AF65-F5344CB8AC3E}">
-        <p14:creationId xmlns:p14="http://schemas.microsoft.com/office/powerpoint/2010/main" val="819911350"/>
-      </p:ext>
-    </p:extLst>
-  </p:cSld>
-  <p:clrMapOvr>
-    <a:masterClrMapping/>
-  </p:clrMapOvr>
-</p:sld>
-</file>
-
-<file path=ppt/slides/slide20.xml><?xml version="1.0" encoding="utf-8"?>
+<file path=ppt/slides/slide21.xml><?xml version="1.0" encoding="utf-8"?>
 <p:sld xmlns:a="http://schemas.openxmlformats.org/drawingml/2006/main" xmlns:r="http://schemas.openxmlformats.org/officeDocument/2006/relationships" xmlns:p="http://schemas.openxmlformats.org/presentationml/2006/main">
   <p:cSld>
     <p:spTree>
@@ -4887,7 +5165,7 @@
 </p:sld>
 </file>
 
-<file path=ppt/slides/slide21.xml><?xml version="1.0" encoding="utf-8"?>
+<file path=ppt/slides/slide22.xml><?xml version="1.0" encoding="utf-8"?>
 <p:sld xmlns:a="http://schemas.openxmlformats.org/drawingml/2006/main" xmlns:r="http://schemas.openxmlformats.org/officeDocument/2006/relationships" xmlns:p="http://schemas.openxmlformats.org/presentationml/2006/main">
   <p:cSld>
     <p:spTree>
@@ -5002,7 +5280,7 @@
 </p:sld>
 </file>
 
-<file path=ppt/slides/slide22.xml><?xml version="1.0" encoding="utf-8"?>
+<file path=ppt/slides/slide23.xml><?xml version="1.0" encoding="utf-8"?>
 <p:sld xmlns:a="http://schemas.openxmlformats.org/drawingml/2006/main" xmlns:r="http://schemas.openxmlformats.org/officeDocument/2006/relationships" xmlns:p="http://schemas.openxmlformats.org/presentationml/2006/main">
   <p:cSld>
     <p:spTree>
@@ -5121,7 +5399,7 @@
 </p:sld>
 </file>
 
-<file path=ppt/slides/slide23.xml><?xml version="1.0" encoding="utf-8"?>
+<file path=ppt/slides/slide24.xml><?xml version="1.0" encoding="utf-8"?>
 <p:sld xmlns:a="http://schemas.openxmlformats.org/drawingml/2006/main" xmlns:r="http://schemas.openxmlformats.org/officeDocument/2006/relationships" xmlns:p="http://schemas.openxmlformats.org/presentationml/2006/main">
   <p:cSld>
     <p:spTree>
@@ -5944,6 +6222,103 @@
 </file>
 
 <file path=ppt/slides/slide8.xml><?xml version="1.0" encoding="utf-8"?>
+<p:sld xmlns:a="http://schemas.openxmlformats.org/drawingml/2006/main" xmlns:r="http://schemas.openxmlformats.org/officeDocument/2006/relationships" xmlns:p="http://schemas.openxmlformats.org/presentationml/2006/main">
+  <p:cSld>
+    <p:spTree>
+      <p:nvGrpSpPr>
+        <p:cNvPr id="1" name=""/>
+        <p:cNvGrpSpPr/>
+        <p:nvPr/>
+      </p:nvGrpSpPr>
+      <p:grpSpPr>
+        <a:xfrm>
+          <a:off x="0" y="0"/>
+          <a:ext cx="0" cy="0"/>
+          <a:chOff x="0" y="0"/>
+          <a:chExt cx="0" cy="0"/>
+        </a:xfrm>
+      </p:grpSpPr>
+      <p:pic>
+        <p:nvPicPr>
+          <p:cNvPr id="4" name="Picture 3"/>
+          <p:cNvPicPr>
+            <a:picLocks noChangeAspect="1"/>
+          </p:cNvPicPr>
+          <p:nvPr/>
+        </p:nvPicPr>
+        <p:blipFill rotWithShape="1">
+          <a:blip r:embed="rId2">
+            <a:extLst>
+              <a:ext uri="{28A0092B-C50C-407E-A947-70E740481C1C}">
+                <a14:useLocalDpi xmlns:a14="http://schemas.microsoft.com/office/drawing/2010/main" val="0"/>
+              </a:ext>
+            </a:extLst>
+          </a:blip>
+          <a:srcRect t="-1" b="12944"/>
+          <a:stretch/>
+        </p:blipFill>
+        <p:spPr>
+          <a:xfrm>
+            <a:off x="2207810" y="1064529"/>
+            <a:ext cx="7724676" cy="5463901"/>
+          </a:xfrm>
+          <a:prstGeom prst="rect">
+            <a:avLst/>
+          </a:prstGeom>
+        </p:spPr>
+      </p:pic>
+      <p:sp>
+        <p:nvSpPr>
+          <p:cNvPr id="5" name="Title 1"/>
+          <p:cNvSpPr>
+            <a:spLocks noGrp="1"/>
+          </p:cNvSpPr>
+          <p:nvPr>
+            <p:ph type="title"/>
+          </p:nvPr>
+        </p:nvSpPr>
+        <p:spPr>
+          <a:xfrm>
+            <a:off x="1128167" y="0"/>
+            <a:ext cx="10703943" cy="1285093"/>
+          </a:xfrm>
+        </p:spPr>
+        <p:txBody>
+          <a:bodyPr>
+            <a:normAutofit/>
+          </a:bodyPr>
+          <a:lstStyle/>
+          <a:p>
+            <a:r>
+              <a:rPr lang="en-US" dirty="0" smtClean="0"/>
+              <a:t>W</a:t>
+            </a:r>
+            <a:r>
+              <a:rPr lang="en-US" dirty="0" smtClean="0"/>
+              <a:t>hen </a:t>
+            </a:r>
+            <a:r>
+              <a:rPr lang="en-US" dirty="0" smtClean="0"/>
+              <a:t>would I use the CLI in a DH project?</a:t>
+            </a:r>
+            <a:endParaRPr lang="en-US" dirty="0"/>
+          </a:p>
+        </p:txBody>
+      </p:sp>
+    </p:spTree>
+    <p:extLst>
+      <p:ext uri="{BB962C8B-B14F-4D97-AF65-F5344CB8AC3E}">
+        <p14:creationId xmlns:p14="http://schemas.microsoft.com/office/powerpoint/2010/main" val="1376722408"/>
+      </p:ext>
+    </p:extLst>
+  </p:cSld>
+  <p:clrMapOvr>
+    <a:masterClrMapping/>
+  </p:clrMapOvr>
+</p:sld>
+</file>
+
+<file path=ppt/slides/slide9.xml><?xml version="1.0" encoding="utf-8"?>
 <p:sld xmlns:a="http://schemas.openxmlformats.org/drawingml/2006/main" xmlns:r="http://schemas.openxmlformats.org/officeDocument/2006/relationships" xmlns:p="http://schemas.openxmlformats.org/presentationml/2006/main">
   <p:cSld>
     <p:spTree>
@@ -6677,116 +7052,6 @@
     <p:extLst>
       <p:ext uri="{BB962C8B-B14F-4D97-AF65-F5344CB8AC3E}">
         <p14:creationId xmlns:p14="http://schemas.microsoft.com/office/powerpoint/2010/main" val="4184098337"/>
-      </p:ext>
-    </p:extLst>
-  </p:cSld>
-  <p:clrMapOvr>
-    <a:masterClrMapping/>
-  </p:clrMapOvr>
-  <p:timing>
-    <p:tnLst>
-      <p:par>
-        <p:cTn id="1" dur="indefinite" restart="never" nodeType="tmRoot"/>
-      </p:par>
-    </p:tnLst>
-  </p:timing>
-</p:sld>
-</file>
-
-<file path=ppt/slides/slide9.xml><?xml version="1.0" encoding="utf-8"?>
-<p:sld xmlns:a="http://schemas.openxmlformats.org/drawingml/2006/main" xmlns:r="http://schemas.openxmlformats.org/officeDocument/2006/relationships" xmlns:p="http://schemas.openxmlformats.org/presentationml/2006/main">
-  <p:cSld>
-    <p:spTree>
-      <p:nvGrpSpPr>
-        <p:cNvPr id="1" name=""/>
-        <p:cNvGrpSpPr/>
-        <p:nvPr/>
-      </p:nvGrpSpPr>
-      <p:grpSpPr>
-        <a:xfrm>
-          <a:off x="0" y="0"/>
-          <a:ext cx="0" cy="0"/>
-          <a:chOff x="0" y="0"/>
-          <a:chExt cx="0" cy="0"/>
-        </a:xfrm>
-      </p:grpSpPr>
-      <p:pic>
-        <p:nvPicPr>
-          <p:cNvPr id="5" name="Picture 4"/>
-          <p:cNvPicPr>
-            <a:picLocks noChangeAspect="1"/>
-          </p:cNvPicPr>
-          <p:nvPr/>
-        </p:nvPicPr>
-        <p:blipFill>
-          <a:blip r:embed="rId2"/>
-          <a:stretch>
-            <a:fillRect/>
-          </a:stretch>
-        </p:blipFill>
-        <p:spPr>
-          <a:xfrm>
-            <a:off x="1860885" y="1277708"/>
-            <a:ext cx="8069178" cy="5218064"/>
-          </a:xfrm>
-          <a:prstGeom prst="rect">
-            <a:avLst/>
-          </a:prstGeom>
-        </p:spPr>
-      </p:pic>
-      <p:sp>
-        <p:nvSpPr>
-          <p:cNvPr id="6" name="Title 1"/>
-          <p:cNvSpPr txBox="1">
-            <a:spLocks/>
-          </p:cNvSpPr>
-          <p:nvPr/>
-        </p:nvSpPr>
-        <p:spPr>
-          <a:xfrm>
-            <a:off x="3176337" y="-481847"/>
-            <a:ext cx="9144000" cy="2387600"/>
-          </a:xfrm>
-          <a:prstGeom prst="rect">
-            <a:avLst/>
-          </a:prstGeom>
-        </p:spPr>
-        <p:txBody>
-          <a:bodyPr vert="horz" lIns="91440" tIns="45720" rIns="91440" bIns="45720" rtlCol="0" anchor="ctr">
-            <a:normAutofit/>
-          </a:bodyPr>
-          <a:lstStyle>
-            <a:lvl1pPr algn="l" defTabSz="914400" rtl="0" eaLnBrk="1" latinLnBrk="0" hangingPunct="1">
-              <a:lnSpc>
-                <a:spcPct val="90000"/>
-              </a:lnSpc>
-              <a:spcBef>
-                <a:spcPct val="0"/>
-              </a:spcBef>
-              <a:buNone/>
-              <a:defRPr sz="4400" kern="1200">
-                <a:solidFill>
-                  <a:schemeClr val="tx1"/>
-                </a:solidFill>
-                <a:latin typeface="+mj-lt"/>
-                <a:ea typeface="+mj-ea"/>
-                <a:cs typeface="+mj-cs"/>
-              </a:defRPr>
-            </a:lvl1pPr>
-          </a:lstStyle>
-          <a:p>
-            <a:r>
-              <a:rPr lang="en-US" dirty="0" smtClean="0"/>
-              <a:t>You are a programmer!</a:t>
-            </a:r>
-            <a:endParaRPr lang="en-US" dirty="0"/>
-          </a:p>
-        </p:txBody>
-      </p:sp>
-    </p:spTree>
-    <p:extLst>
-      <p:ext uri="{BB962C8B-B14F-4D97-AF65-F5344CB8AC3E}">
-        <p14:creationId xmlns:p14="http://schemas.microsoft.com/office/powerpoint/2010/main" val="4285280753"/>
       </p:ext>
     </p:extLst>
   </p:cSld>

</xml_diff>

<commit_message>
Added slide providing more context for how Git shows up in DH projects.
</commit_message>
<xml_diff>
--- a/2019/misc/CLI Git.pptx
+++ b/2019/misc/CLI Git.pptx
@@ -25,10 +25,12 @@
     <p:sldId id="272" r:id="rId19"/>
     <p:sldId id="275" r:id="rId20"/>
     <p:sldId id="277" r:id="rId21"/>
-    <p:sldId id="283" r:id="rId22"/>
-    <p:sldId id="278" r:id="rId23"/>
-    <p:sldId id="279" r:id="rId24"/>
-    <p:sldId id="281" r:id="rId25"/>
+    <p:sldId id="288" r:id="rId22"/>
+    <p:sldId id="289" r:id="rId23"/>
+    <p:sldId id="283" r:id="rId24"/>
+    <p:sldId id="278" r:id="rId25"/>
+    <p:sldId id="279" r:id="rId26"/>
+    <p:sldId id="281" r:id="rId27"/>
   </p:sldIdLst>
   <p:sldSz cx="12192000" cy="6858000"/>
   <p:notesSz cx="6858000" cy="9144000"/>
@@ -3710,11 +3712,7 @@
             </a:pPr>
             <a:r>
               <a:rPr lang="en-US" dirty="0" smtClean="0"/>
-              <a:t>What is the </a:t>
-            </a:r>
-            <a:r>
-              <a:rPr lang="en-US" dirty="0" smtClean="0"/>
-              <a:t>“version controlling”?</a:t>
+              <a:t>What is the “version controlling”?</a:t>
             </a:r>
           </a:p>
           <a:p>
@@ -3734,7 +3732,6 @@
               <a:rPr lang="en-US" dirty="0" smtClean="0"/>
               <a:t>”?</a:t>
             </a:r>
-            <a:endParaRPr lang="en-US" dirty="0" smtClean="0"/>
           </a:p>
           <a:p>
             <a:pPr marL="514350" indent="-514350">
@@ -3743,13 +3740,8 @@
             </a:pPr>
             <a:r>
               <a:rPr lang="en-US" dirty="0" smtClean="0"/>
-              <a:t>How </a:t>
-            </a:r>
-            <a:r>
-              <a:rPr lang="en-US" dirty="0" smtClean="0"/>
-              <a:t>do I use it?</a:t>
-            </a:r>
-            <a:endParaRPr lang="en-US" dirty="0" smtClean="0"/>
+              <a:t>How do I use it?</a:t>
+            </a:r>
           </a:p>
           <a:p>
             <a:pPr marL="514350" indent="-514350">
@@ -5116,6 +5108,137 @@
           <a:chExt cx="0" cy="0"/>
         </a:xfrm>
       </p:grpSpPr>
+    </p:spTree>
+    <p:extLst>
+      <p:ext uri="{BB962C8B-B14F-4D97-AF65-F5344CB8AC3E}">
+        <p14:creationId xmlns:p14="http://schemas.microsoft.com/office/powerpoint/2010/main" val="2746534782"/>
+      </p:ext>
+    </p:extLst>
+  </p:cSld>
+  <p:clrMapOvr>
+    <a:masterClrMapping/>
+  </p:clrMapOvr>
+</p:sld>
+</file>
+
+<file path=ppt/slides/slide22.xml><?xml version="1.0" encoding="utf-8"?>
+<p:sld xmlns:a="http://schemas.openxmlformats.org/drawingml/2006/main" xmlns:r="http://schemas.openxmlformats.org/officeDocument/2006/relationships" xmlns:p="http://schemas.openxmlformats.org/presentationml/2006/main">
+  <p:cSld>
+    <p:spTree>
+      <p:nvGrpSpPr>
+        <p:cNvPr id="1" name=""/>
+        <p:cNvGrpSpPr/>
+        <p:nvPr/>
+      </p:nvGrpSpPr>
+      <p:grpSpPr>
+        <a:xfrm>
+          <a:off x="0" y="0"/>
+          <a:ext cx="0" cy="0"/>
+          <a:chOff x="0" y="0"/>
+          <a:chExt cx="0" cy="0"/>
+        </a:xfrm>
+      </p:grpSpPr>
+      <p:pic>
+        <p:nvPicPr>
+          <p:cNvPr id="4" name="Picture 3"/>
+          <p:cNvPicPr>
+            <a:picLocks noChangeAspect="1"/>
+          </p:cNvPicPr>
+          <p:nvPr/>
+        </p:nvPicPr>
+        <p:blipFill rotWithShape="1">
+          <a:blip r:embed="rId2">
+            <a:extLst>
+              <a:ext uri="{28A0092B-C50C-407E-A947-70E740481C1C}">
+                <a14:useLocalDpi xmlns:a14="http://schemas.microsoft.com/office/drawing/2010/main" val="0"/>
+              </a:ext>
+            </a:extLst>
+          </a:blip>
+          <a:srcRect t="-1" b="12944"/>
+          <a:stretch/>
+        </p:blipFill>
+        <p:spPr>
+          <a:xfrm>
+            <a:off x="2207810" y="1064529"/>
+            <a:ext cx="7724676" cy="5463901"/>
+          </a:xfrm>
+          <a:prstGeom prst="rect">
+            <a:avLst/>
+          </a:prstGeom>
+        </p:spPr>
+      </p:pic>
+      <p:sp>
+        <p:nvSpPr>
+          <p:cNvPr id="5" name="Title 1"/>
+          <p:cNvSpPr>
+            <a:spLocks noGrp="1"/>
+          </p:cNvSpPr>
+          <p:nvPr>
+            <p:ph type="title"/>
+          </p:nvPr>
+        </p:nvSpPr>
+        <p:spPr>
+          <a:xfrm>
+            <a:off x="1128167" y="0"/>
+            <a:ext cx="10703943" cy="1285093"/>
+          </a:xfrm>
+        </p:spPr>
+        <p:txBody>
+          <a:bodyPr>
+            <a:normAutofit/>
+          </a:bodyPr>
+          <a:lstStyle/>
+          <a:p>
+            <a:r>
+              <a:rPr lang="en-US" dirty="0" smtClean="0"/>
+              <a:t>When would I use the </a:t>
+            </a:r>
+            <a:r>
+              <a:rPr lang="en-US" dirty="0" err="1" smtClean="0"/>
+              <a:t>Git</a:t>
+            </a:r>
+            <a:r>
+              <a:rPr lang="en-US" dirty="0" smtClean="0"/>
+              <a:t> in </a:t>
+            </a:r>
+            <a:r>
+              <a:rPr lang="en-US" dirty="0" smtClean="0"/>
+              <a:t>a DH project?</a:t>
+            </a:r>
+            <a:endParaRPr lang="en-US" dirty="0"/>
+          </a:p>
+        </p:txBody>
+      </p:sp>
+    </p:spTree>
+    <p:extLst>
+      <p:ext uri="{BB962C8B-B14F-4D97-AF65-F5344CB8AC3E}">
+        <p14:creationId xmlns:p14="http://schemas.microsoft.com/office/powerpoint/2010/main" val="3217365164"/>
+      </p:ext>
+    </p:extLst>
+  </p:cSld>
+  <p:clrMapOvr>
+    <a:masterClrMapping/>
+  </p:clrMapOvr>
+</p:sld>
+</file>
+
+<file path=ppt/slides/slide23.xml><?xml version="1.0" encoding="utf-8"?>
+<p:sld xmlns:a="http://schemas.openxmlformats.org/drawingml/2006/main" xmlns:r="http://schemas.openxmlformats.org/officeDocument/2006/relationships" xmlns:p="http://schemas.openxmlformats.org/presentationml/2006/main">
+  <p:cSld>
+    <p:spTree>
+      <p:nvGrpSpPr>
+        <p:cNvPr id="1" name=""/>
+        <p:cNvGrpSpPr/>
+        <p:nvPr/>
+      </p:nvGrpSpPr>
+      <p:grpSpPr>
+        <a:xfrm>
+          <a:off x="0" y="0"/>
+          <a:ext cx="0" cy="0"/>
+          <a:chOff x="0" y="0"/>
+          <a:chExt cx="0" cy="0"/>
+        </a:xfrm>
+      </p:grpSpPr>
       <p:pic>
         <p:nvPicPr>
           <p:cNvPr id="4" name="Content Placeholder 3"/>
@@ -5165,7 +5288,7 @@
 </p:sld>
 </file>
 
-<file path=ppt/slides/slide22.xml><?xml version="1.0" encoding="utf-8"?>
+<file path=ppt/slides/slide24.xml><?xml version="1.0" encoding="utf-8"?>
 <p:sld xmlns:a="http://schemas.openxmlformats.org/drawingml/2006/main" xmlns:r="http://schemas.openxmlformats.org/officeDocument/2006/relationships" xmlns:p="http://schemas.openxmlformats.org/presentationml/2006/main">
   <p:cSld>
     <p:spTree>
@@ -5280,7 +5403,7 @@
 </p:sld>
 </file>
 
-<file path=ppt/slides/slide23.xml><?xml version="1.0" encoding="utf-8"?>
+<file path=ppt/slides/slide25.xml><?xml version="1.0" encoding="utf-8"?>
 <p:sld xmlns:a="http://schemas.openxmlformats.org/drawingml/2006/main" xmlns:r="http://schemas.openxmlformats.org/officeDocument/2006/relationships" xmlns:p="http://schemas.openxmlformats.org/presentationml/2006/main">
   <p:cSld>
     <p:spTree>
@@ -5399,7 +5522,7 @@
 </p:sld>
 </file>
 
-<file path=ppt/slides/slide24.xml><?xml version="1.0" encoding="utf-8"?>
+<file path=ppt/slides/slide26.xml><?xml version="1.0" encoding="utf-8"?>
 <p:sld xmlns:a="http://schemas.openxmlformats.org/drawingml/2006/main" xmlns:r="http://schemas.openxmlformats.org/officeDocument/2006/relationships" xmlns:p="http://schemas.openxmlformats.org/presentationml/2006/main">
   <p:cSld>
     <p:spTree>
@@ -6291,15 +6414,7 @@
           <a:p>
             <a:r>
               <a:rPr lang="en-US" dirty="0" smtClean="0"/>
-              <a:t>W</a:t>
-            </a:r>
-            <a:r>
-              <a:rPr lang="en-US" dirty="0" smtClean="0"/>
-              <a:t>hen </a:t>
-            </a:r>
-            <a:r>
-              <a:rPr lang="en-US" dirty="0" smtClean="0"/>
-              <a:t>would I use the CLI in a DH project?</a:t>
+              <a:t>When would I use the CLI in a DH project?</a:t>
             </a:r>
             <a:endParaRPr lang="en-US" dirty="0"/>
           </a:p>

</xml_diff>

<commit_message>
added some images for potential use contexts
</commit_message>
<xml_diff>
--- a/2019/misc/CLI Git.pptx
+++ b/2019/misc/CLI Git.pptx
@@ -25,8 +25,8 @@
     <p:sldId id="272" r:id="rId19"/>
     <p:sldId id="275" r:id="rId20"/>
     <p:sldId id="277" r:id="rId21"/>
-    <p:sldId id="288" r:id="rId22"/>
-    <p:sldId id="289" r:id="rId23"/>
+    <p:sldId id="290" r:id="rId22"/>
+    <p:sldId id="291" r:id="rId23"/>
     <p:sldId id="283" r:id="rId24"/>
     <p:sldId id="278" r:id="rId25"/>
     <p:sldId id="279" r:id="rId26"/>
@@ -5108,10 +5108,82 @@
           <a:chExt cx="0" cy="0"/>
         </a:xfrm>
       </p:grpSpPr>
+      <p:sp>
+        <p:nvSpPr>
+          <p:cNvPr id="5" name="Title 1"/>
+          <p:cNvSpPr>
+            <a:spLocks noGrp="1"/>
+          </p:cNvSpPr>
+          <p:nvPr>
+            <p:ph type="title"/>
+          </p:nvPr>
+        </p:nvSpPr>
+        <p:spPr>
+          <a:xfrm>
+            <a:off x="1488057" y="0"/>
+            <a:ext cx="10703943" cy="1285093"/>
+          </a:xfrm>
+        </p:spPr>
+        <p:txBody>
+          <a:bodyPr>
+            <a:normAutofit/>
+          </a:bodyPr>
+          <a:lstStyle/>
+          <a:p>
+            <a:r>
+              <a:rPr lang="en-US" dirty="0" smtClean="0"/>
+              <a:t>When would I use </a:t>
+            </a:r>
+            <a:r>
+              <a:rPr lang="en-US" dirty="0" err="1" smtClean="0"/>
+              <a:t>Git</a:t>
+            </a:r>
+            <a:r>
+              <a:rPr lang="en-US" dirty="0" smtClean="0"/>
+              <a:t> in </a:t>
+            </a:r>
+            <a:r>
+              <a:rPr lang="en-US" dirty="0" smtClean="0"/>
+              <a:t>a DH project?</a:t>
+            </a:r>
+            <a:endParaRPr lang="en-US" dirty="0"/>
+          </a:p>
+        </p:txBody>
+      </p:sp>
+      <p:pic>
+        <p:nvPicPr>
+          <p:cNvPr id="2" name="Picture 1"/>
+          <p:cNvPicPr>
+            <a:picLocks noChangeAspect="1"/>
+          </p:cNvPicPr>
+          <p:nvPr/>
+        </p:nvPicPr>
+        <p:blipFill>
+          <a:blip r:embed="rId2">
+            <a:extLst>
+              <a:ext uri="{28A0092B-C50C-407E-A947-70E740481C1C}">
+                <a14:useLocalDpi xmlns:a14="http://schemas.microsoft.com/office/drawing/2010/main" val="0"/>
+              </a:ext>
+            </a:extLst>
+          </a:blip>
+          <a:stretch>
+            <a:fillRect/>
+          </a:stretch>
+        </p:blipFill>
+        <p:spPr>
+          <a:xfrm>
+            <a:off x="1793631" y="986497"/>
+            <a:ext cx="8299938" cy="5723499"/>
+          </a:xfrm>
+          <a:prstGeom prst="rect">
+            <a:avLst/>
+          </a:prstGeom>
+        </p:spPr>
+      </p:pic>
     </p:spTree>
     <p:extLst>
       <p:ext uri="{BB962C8B-B14F-4D97-AF65-F5344CB8AC3E}">
-        <p14:creationId xmlns:p14="http://schemas.microsoft.com/office/powerpoint/2010/main" val="2746534782"/>
+        <p14:creationId xmlns:p14="http://schemas.microsoft.com/office/powerpoint/2010/main" val="456551267"/>
       </p:ext>
     </p:extLst>
   </p:cSld>
@@ -5138,15 +5210,57 @@
           <a:chExt cx="0" cy="0"/>
         </a:xfrm>
       </p:grpSpPr>
+      <p:sp>
+        <p:nvSpPr>
+          <p:cNvPr id="5" name="Title 1"/>
+          <p:cNvSpPr>
+            <a:spLocks noGrp="1"/>
+          </p:cNvSpPr>
+          <p:nvPr>
+            <p:ph type="title"/>
+          </p:nvPr>
+        </p:nvSpPr>
+        <p:spPr>
+          <a:xfrm>
+            <a:off x="1488057" y="0"/>
+            <a:ext cx="10703943" cy="1285093"/>
+          </a:xfrm>
+        </p:spPr>
+        <p:txBody>
+          <a:bodyPr>
+            <a:normAutofit/>
+          </a:bodyPr>
+          <a:lstStyle/>
+          <a:p>
+            <a:r>
+              <a:rPr lang="en-US" dirty="0" smtClean="0"/>
+              <a:t>When would I use </a:t>
+            </a:r>
+            <a:r>
+              <a:rPr lang="en-US" dirty="0" err="1" smtClean="0"/>
+              <a:t>Git</a:t>
+            </a:r>
+            <a:r>
+              <a:rPr lang="en-US" dirty="0" smtClean="0"/>
+              <a:t> in </a:t>
+            </a:r>
+            <a:r>
+              <a:rPr lang="en-US" dirty="0" smtClean="0"/>
+              <a:t>a DH project?</a:t>
+            </a:r>
+            <a:endParaRPr lang="en-US" dirty="0"/>
+          </a:p>
+        </p:txBody>
+      </p:sp>
       <p:pic>
         <p:nvPicPr>
-          <p:cNvPr id="4" name="Picture 3"/>
+          <p:cNvPr id="3" name="Picture 2"/>
           <p:cNvPicPr>
             <a:picLocks noChangeAspect="1"/>
           </p:cNvPicPr>
           <p:nvPr/>
         </p:nvPicPr>
-        <p:blipFill rotWithShape="1">
+        <p:blipFill>
           <a:blip r:embed="rId2">
             <a:extLst>
               <a:ext uri="{28A0092B-C50C-407E-A947-70E740481C1C}">
@@ -5154,65 +5268,24 @@
               </a:ext>
             </a:extLst>
           </a:blip>
-          <a:srcRect t="-1" b="12944"/>
-          <a:stretch/>
+          <a:stretch>
+            <a:fillRect/>
+          </a:stretch>
         </p:blipFill>
         <p:spPr>
           <a:xfrm>
-            <a:off x="2207810" y="1064529"/>
-            <a:ext cx="7724676" cy="5463901"/>
+            <a:off x="2110155" y="1104038"/>
+            <a:ext cx="7455877" cy="5584598"/>
           </a:xfrm>
           <a:prstGeom prst="rect">
             <a:avLst/>
           </a:prstGeom>
         </p:spPr>
       </p:pic>
-      <p:sp>
-        <p:nvSpPr>
-          <p:cNvPr id="5" name="Title 1"/>
-          <p:cNvSpPr>
-            <a:spLocks noGrp="1"/>
-          </p:cNvSpPr>
-          <p:nvPr>
-            <p:ph type="title"/>
-          </p:nvPr>
-        </p:nvSpPr>
-        <p:spPr>
-          <a:xfrm>
-            <a:off x="1128167" y="0"/>
-            <a:ext cx="10703943" cy="1285093"/>
-          </a:xfrm>
-        </p:spPr>
-        <p:txBody>
-          <a:bodyPr>
-            <a:normAutofit/>
-          </a:bodyPr>
-          <a:lstStyle/>
-          <a:p>
-            <a:r>
-              <a:rPr lang="en-US" dirty="0" smtClean="0"/>
-              <a:t>When would I use the </a:t>
-            </a:r>
-            <a:r>
-              <a:rPr lang="en-US" dirty="0" err="1" smtClean="0"/>
-              <a:t>Git</a:t>
-            </a:r>
-            <a:r>
-              <a:rPr lang="en-US" dirty="0" smtClean="0"/>
-              <a:t> in </a:t>
-            </a:r>
-            <a:r>
-              <a:rPr lang="en-US" dirty="0" smtClean="0"/>
-              <a:t>a DH project?</a:t>
-            </a:r>
-            <a:endParaRPr lang="en-US" dirty="0"/>
-          </a:p>
-        </p:txBody>
-      </p:sp>
     </p:spTree>
     <p:extLst>
       <p:ext uri="{BB962C8B-B14F-4D97-AF65-F5344CB8AC3E}">
-        <p14:creationId xmlns:p14="http://schemas.microsoft.com/office/powerpoint/2010/main" val="3217365164"/>
+        <p14:creationId xmlns:p14="http://schemas.microsoft.com/office/powerpoint/2010/main" val="3522249683"/>
       </p:ext>
     </p:extLst>
   </p:cSld>

</xml_diff>